<commit_message>
Minor fixes in the presentation.
</commit_message>
<xml_diff>
--- a/Presentation/yukon final presentation.pptx
+++ b/Presentation/yukon final presentation.pptx
@@ -5,7 +5,7 @@
     <p:sldMasterId id="2147483648" r:id="rId1"/>
   </p:sldMasterIdLst>
   <p:notesMasterIdLst>
-    <p:notesMasterId r:id="rId30"/>
+    <p:notesMasterId r:id="rId29"/>
   </p:notesMasterIdLst>
   <p:sldIdLst>
     <p:sldId id="256" r:id="rId2"/>
@@ -17,25 +17,24 @@
     <p:sldId id="260" r:id="rId8"/>
     <p:sldId id="264" r:id="rId9"/>
     <p:sldId id="267" r:id="rId10"/>
-    <p:sldId id="268" r:id="rId11"/>
-    <p:sldId id="269" r:id="rId12"/>
-    <p:sldId id="270" r:id="rId13"/>
-    <p:sldId id="271" r:id="rId14"/>
-    <p:sldId id="272" r:id="rId15"/>
-    <p:sldId id="276" r:id="rId16"/>
-    <p:sldId id="275" r:id="rId17"/>
-    <p:sldId id="273" r:id="rId18"/>
-    <p:sldId id="274" r:id="rId19"/>
-    <p:sldId id="277" r:id="rId20"/>
-    <p:sldId id="279" r:id="rId21"/>
-    <p:sldId id="281" r:id="rId22"/>
-    <p:sldId id="284" r:id="rId23"/>
-    <p:sldId id="282" r:id="rId24"/>
-    <p:sldId id="283" r:id="rId25"/>
-    <p:sldId id="285" r:id="rId26"/>
-    <p:sldId id="286" r:id="rId27"/>
-    <p:sldId id="287" r:id="rId28"/>
-    <p:sldId id="288" r:id="rId29"/>
+    <p:sldId id="269" r:id="rId11"/>
+    <p:sldId id="270" r:id="rId12"/>
+    <p:sldId id="271" r:id="rId13"/>
+    <p:sldId id="272" r:id="rId14"/>
+    <p:sldId id="276" r:id="rId15"/>
+    <p:sldId id="275" r:id="rId16"/>
+    <p:sldId id="273" r:id="rId17"/>
+    <p:sldId id="274" r:id="rId18"/>
+    <p:sldId id="277" r:id="rId19"/>
+    <p:sldId id="279" r:id="rId20"/>
+    <p:sldId id="281" r:id="rId21"/>
+    <p:sldId id="284" r:id="rId22"/>
+    <p:sldId id="282" r:id="rId23"/>
+    <p:sldId id="283" r:id="rId24"/>
+    <p:sldId id="285" r:id="rId25"/>
+    <p:sldId id="286" r:id="rId26"/>
+    <p:sldId id="287" r:id="rId27"/>
+    <p:sldId id="288" r:id="rId28"/>
   </p:sldIdLst>
   <p:sldSz cx="9144000" cy="6858000" type="screen4x3"/>
   <p:notesSz cx="6858000" cy="9144000"/>
@@ -219,7 +218,7 @@
           <a:p>
             <a:fld id="{8B85FA1A-2C64-43FC-B426-1EBCB2ACAA95}" type="datetimeFigureOut">
               <a:rPr lang="en-US" smtClean="0"/>
-              <a:t>12/10/2012</a:t>
+              <a:t>12/11/2012</a:t>
             </a:fld>
             <a:endParaRPr lang="en-US"/>
           </a:p>
@@ -1432,7 +1431,7 @@
           <a:p>
             <a:fld id="{7C25D943-6960-C14D-ACAB-F902DA38E591}" type="datetimeFigureOut">
               <a:rPr lang="en-US" smtClean="0"/>
-              <a:t>12/10/2012</a:t>
+              <a:t>12/11/2012</a:t>
             </a:fld>
             <a:endParaRPr lang="en-US"/>
           </a:p>
@@ -1906,10 +1905,6 @@
               </a:rPr>
               <a:t>SARAH GILLILAND</a:t>
             </a:r>
-            <a:endParaRPr lang="en-US" sz="3600" dirty="0" smtClean="0">
-              <a:latin typeface="小塚ゴシック Pro L" pitchFamily="34" charset="-128"/>
-              <a:ea typeface="小塚ゴシック Pro L" pitchFamily="34" charset="-128"/>
-            </a:endParaRPr>
           </a:p>
           <a:p>
             <a:r>
@@ -1917,14 +1912,7 @@
                 <a:latin typeface="小塚ゴシック Pro L" pitchFamily="34" charset="-128"/>
                 <a:ea typeface="小塚ゴシック Pro L" pitchFamily="34" charset="-128"/>
               </a:rPr>
-              <a:t>TOMISLAV </a:t>
-            </a:r>
-            <a:r>
-              <a:rPr lang="en-US" sz="3600" dirty="0" smtClean="0">
-                <a:latin typeface="小塚ゴシック Pro L" pitchFamily="34" charset="-128"/>
-                <a:ea typeface="小塚ゴシック Pro L" pitchFamily="34" charset="-128"/>
-              </a:rPr>
-              <a:t>PEJSA</a:t>
+              <a:t>TOMISLAV PEJSA</a:t>
             </a:r>
             <a:endParaRPr lang="en-US" sz="3600" dirty="0">
               <a:latin typeface="小塚ゴシック Pro L" pitchFamily="34" charset="-128"/>
@@ -1973,6 +1961,52 @@
       </p:grpSpPr>
       <p:sp>
         <p:nvSpPr>
+          <p:cNvPr id="61" name="Rectangle 60"/>
+          <p:cNvSpPr/>
+          <p:nvPr/>
+        </p:nvSpPr>
+        <p:spPr>
+          <a:xfrm>
+            <a:off x="533400" y="3988130"/>
+            <a:ext cx="8153400" cy="2641270"/>
+          </a:xfrm>
+          <a:prstGeom prst="rect">
+            <a:avLst/>
+          </a:prstGeom>
+          <a:solidFill>
+            <a:srgbClr val="00FF00">
+              <a:alpha val="23922"/>
+            </a:srgbClr>
+          </a:solidFill>
+          <a:ln>
+            <a:noFill/>
+          </a:ln>
+        </p:spPr>
+        <p:style>
+          <a:lnRef idx="1">
+            <a:schemeClr val="accent3"/>
+          </a:lnRef>
+          <a:fillRef idx="3">
+            <a:schemeClr val="accent3"/>
+          </a:fillRef>
+          <a:effectRef idx="2">
+            <a:schemeClr val="accent3"/>
+          </a:effectRef>
+          <a:fontRef idx="minor">
+            <a:schemeClr val="lt1"/>
+          </a:fontRef>
+        </p:style>
+        <p:txBody>
+          <a:bodyPr rtlCol="0" anchor="ctr"/>
+          <a:lstStyle/>
+          <a:p>
+            <a:pPr algn="ctr"/>
+            <a:endParaRPr lang="en-US"/>
+          </a:p>
+        </p:txBody>
+      </p:sp>
+      <p:sp>
+        <p:nvSpPr>
           <p:cNvPr id="7" name="Cloud 6"/>
           <p:cNvSpPr/>
           <p:nvPr/>
@@ -2016,52 +2050,6 @@
               <a:latin typeface="小塚ゴシック Pro L" pitchFamily="34" charset="-128"/>
               <a:ea typeface="小塚ゴシック Pro L" pitchFamily="34" charset="-128"/>
             </a:endParaRPr>
-          </a:p>
-        </p:txBody>
-      </p:sp>
-      <p:sp>
-        <p:nvSpPr>
-          <p:cNvPr id="61" name="Rectangle 60"/>
-          <p:cNvSpPr/>
-          <p:nvPr/>
-        </p:nvSpPr>
-        <p:spPr>
-          <a:xfrm>
-            <a:off x="533400" y="3988130"/>
-            <a:ext cx="8153400" cy="2641270"/>
-          </a:xfrm>
-          <a:prstGeom prst="rect">
-            <a:avLst/>
-          </a:prstGeom>
-          <a:solidFill>
-            <a:srgbClr val="00FF00">
-              <a:alpha val="23922"/>
-            </a:srgbClr>
-          </a:solidFill>
-          <a:ln>
-            <a:noFill/>
-          </a:ln>
-        </p:spPr>
-        <p:style>
-          <a:lnRef idx="1">
-            <a:schemeClr val="accent3"/>
-          </a:lnRef>
-          <a:fillRef idx="3">
-            <a:schemeClr val="accent3"/>
-          </a:fillRef>
-          <a:effectRef idx="2">
-            <a:schemeClr val="accent3"/>
-          </a:effectRef>
-          <a:fontRef idx="minor">
-            <a:schemeClr val="lt1"/>
-          </a:fontRef>
-        </p:style>
-        <p:txBody>
-          <a:bodyPr rtlCol="0" anchor="ctr"/>
-          <a:lstStyle/>
-          <a:p>
-            <a:pPr algn="ctr"/>
-            <a:endParaRPr lang="en-US"/>
           </a:p>
         </p:txBody>
       </p:sp>
@@ -2720,1876 +2708,6 @@
             </a:p>
           </p:txBody>
         </p:sp>
-      </p:grpSp>
-      <p:grpSp>
-        <p:nvGrpSpPr>
-          <p:cNvPr id="30" name="Group 29"/>
-          <p:cNvGrpSpPr/>
-          <p:nvPr/>
-        </p:nvGrpSpPr>
-        <p:grpSpPr>
-          <a:xfrm>
-            <a:off x="2743199" y="4572000"/>
-            <a:ext cx="1409700" cy="1490442"/>
-            <a:chOff x="2687745" y="2998641"/>
-            <a:chExt cx="1752600" cy="1801499"/>
-          </a:xfrm>
-        </p:grpSpPr>
-        <p:sp>
-          <p:nvSpPr>
-            <p:cNvPr id="31" name="Cloud 30"/>
-            <p:cNvSpPr/>
-            <p:nvPr/>
-          </p:nvSpPr>
-          <p:spPr>
-            <a:xfrm>
-              <a:off x="2687745" y="2998641"/>
-              <a:ext cx="1752600" cy="1062145"/>
-            </a:xfrm>
-            <a:prstGeom prst="cloud">
-              <a:avLst/>
-            </a:prstGeom>
-          </p:spPr>
-          <p:style>
-            <a:lnRef idx="1">
-              <a:schemeClr val="dk1"/>
-            </a:lnRef>
-            <a:fillRef idx="3">
-              <a:schemeClr val="dk1"/>
-            </a:fillRef>
-            <a:effectRef idx="2">
-              <a:schemeClr val="dk1"/>
-            </a:effectRef>
-            <a:fontRef idx="minor">
-              <a:schemeClr val="lt1"/>
-            </a:fontRef>
-          </p:style>
-          <p:txBody>
-            <a:bodyPr rtlCol="0" anchor="ctr"/>
-            <a:lstStyle/>
-            <a:p>
-              <a:pPr algn="ctr"/>
-              <a:endParaRPr lang="en-US"/>
-            </a:p>
-          </p:txBody>
-        </p:sp>
-        <p:grpSp>
-          <p:nvGrpSpPr>
-            <p:cNvPr id="32" name="Group 31"/>
-            <p:cNvGrpSpPr/>
-            <p:nvPr/>
-          </p:nvGrpSpPr>
-          <p:grpSpPr>
-            <a:xfrm>
-              <a:off x="2819400" y="3272135"/>
-              <a:ext cx="1489291" cy="1528005"/>
-              <a:chOff x="2549308" y="3530612"/>
-              <a:chExt cx="1489291" cy="1528005"/>
-            </a:xfrm>
-          </p:grpSpPr>
-          <p:sp>
-            <p:nvSpPr>
-              <p:cNvPr id="33" name="Lightning Bolt 32"/>
-              <p:cNvSpPr/>
-              <p:nvPr/>
-            </p:nvSpPr>
-            <p:spPr>
-              <a:xfrm>
-                <a:off x="2971799" y="3908392"/>
-                <a:ext cx="644308" cy="1150225"/>
-              </a:xfrm>
-              <a:prstGeom prst="lightningBolt">
-                <a:avLst/>
-              </a:prstGeom>
-              <a:solidFill>
-                <a:srgbClr val="FFFF00"/>
-              </a:solidFill>
-            </p:spPr>
-            <p:style>
-              <a:lnRef idx="1">
-                <a:schemeClr val="accent1"/>
-              </a:lnRef>
-              <a:fillRef idx="3">
-                <a:schemeClr val="accent1"/>
-              </a:fillRef>
-              <a:effectRef idx="2">
-                <a:schemeClr val="accent1"/>
-              </a:effectRef>
-              <a:fontRef idx="minor">
-                <a:schemeClr val="lt1"/>
-              </a:fontRef>
-            </p:style>
-            <p:txBody>
-              <a:bodyPr rtlCol="0" anchor="ctr"/>
-              <a:lstStyle/>
-              <a:p>
-                <a:pPr algn="ctr"/>
-                <a:endParaRPr lang="en-US" dirty="0"/>
-              </a:p>
-            </p:txBody>
-          </p:sp>
-          <p:sp>
-            <p:nvSpPr>
-              <p:cNvPr id="34" name="TextBox 33"/>
-              <p:cNvSpPr txBox="1"/>
-              <p:nvPr/>
-            </p:nvSpPr>
-            <p:spPr>
-              <a:xfrm>
-                <a:off x="2549308" y="3530612"/>
-                <a:ext cx="1489291" cy="461665"/>
-              </a:xfrm>
-              <a:prstGeom prst="rect">
-                <a:avLst/>
-              </a:prstGeom>
-              <a:noFill/>
-              <a:effectLst/>
-            </p:spPr>
-            <p:txBody>
-              <a:bodyPr wrap="square" rtlCol="0">
-                <a:spAutoFit/>
-              </a:bodyPr>
-              <a:lstStyle/>
-              <a:p>
-                <a:r>
-                  <a:rPr lang="en-US" b="1" dirty="0" smtClean="0">
-                    <a:solidFill>
-                      <a:schemeClr val="bg1"/>
-                    </a:solidFill>
-                    <a:effectLst>
-                      <a:outerShdw blurRad="50800" dist="38100" dir="2700000" algn="tl" rotWithShape="0">
-                        <a:prstClr val="black">
-                          <a:alpha val="40000"/>
-                        </a:prstClr>
-                      </a:outerShdw>
-                    </a:effectLst>
-                    <a:latin typeface="小塚ゴシック Pro L" pitchFamily="34" charset="-128"/>
-                    <a:ea typeface="小塚ゴシック Pro L" pitchFamily="34" charset="-128"/>
-                  </a:rPr>
-                  <a:t>COMMIT!</a:t>
-                </a:r>
-                <a:endParaRPr lang="en-US" b="1" dirty="0">
-                  <a:solidFill>
-                    <a:schemeClr val="bg1"/>
-                  </a:solidFill>
-                  <a:effectLst>
-                    <a:outerShdw blurRad="50800" dist="38100" dir="2700000" algn="tl" rotWithShape="0">
-                      <a:prstClr val="black">
-                        <a:alpha val="40000"/>
-                      </a:prstClr>
-                    </a:outerShdw>
-                  </a:effectLst>
-                  <a:latin typeface="小塚ゴシック Pro L" pitchFamily="34" charset="-128"/>
-                  <a:ea typeface="小塚ゴシック Pro L" pitchFamily="34" charset="-128"/>
-                </a:endParaRPr>
-              </a:p>
-            </p:txBody>
-          </p:sp>
-        </p:grpSp>
-      </p:grpSp>
-      <p:grpSp>
-        <p:nvGrpSpPr>
-          <p:cNvPr id="41" name="Group 40"/>
-          <p:cNvGrpSpPr/>
-          <p:nvPr/>
-        </p:nvGrpSpPr>
-        <p:grpSpPr>
-          <a:xfrm>
-            <a:off x="1442113" y="1703234"/>
-            <a:ext cx="1301087" cy="1957295"/>
-            <a:chOff x="1442113" y="1703234"/>
-            <a:chExt cx="1301087" cy="1957295"/>
-          </a:xfrm>
-        </p:grpSpPr>
-        <p:grpSp>
-          <p:nvGrpSpPr>
-            <p:cNvPr id="42" name="Group 41"/>
-            <p:cNvGrpSpPr/>
-            <p:nvPr/>
-          </p:nvGrpSpPr>
-          <p:grpSpPr>
-            <a:xfrm>
-              <a:off x="1661135" y="1790607"/>
-              <a:ext cx="871351" cy="1362544"/>
-              <a:chOff x="1661135" y="1790607"/>
-              <a:chExt cx="871351" cy="1362544"/>
-            </a:xfrm>
-          </p:grpSpPr>
-          <p:grpSp>
-            <p:nvGrpSpPr>
-              <p:cNvPr id="45" name="Group 44"/>
-              <p:cNvGrpSpPr/>
-              <p:nvPr/>
-            </p:nvGrpSpPr>
-            <p:grpSpPr>
-              <a:xfrm>
-                <a:off x="1819590" y="1790607"/>
-                <a:ext cx="509028" cy="489043"/>
-                <a:chOff x="1819590" y="1790607"/>
-                <a:chExt cx="509028" cy="489043"/>
-              </a:xfrm>
-              <a:solidFill>
-                <a:schemeClr val="tx1"/>
-              </a:solidFill>
-            </p:grpSpPr>
-            <p:sp>
-              <p:nvSpPr>
-                <p:cNvPr id="55" name="Freeform 54"/>
-                <p:cNvSpPr/>
-                <p:nvPr/>
-              </p:nvSpPr>
-              <p:spPr>
-                <a:xfrm>
-                  <a:off x="1819590" y="1790607"/>
-                  <a:ext cx="288610" cy="489043"/>
-                </a:xfrm>
-                <a:custGeom>
-                  <a:avLst/>
-                  <a:gdLst>
-                    <a:gd name="connsiteX0" fmla="*/ 288610 w 288610"/>
-                    <a:gd name="connsiteY0" fmla="*/ 28668 h 489043"/>
-                    <a:gd name="connsiteX1" fmla="*/ 215585 w 288610"/>
-                    <a:gd name="connsiteY1" fmla="*/ 93 h 489043"/>
-                    <a:gd name="connsiteX2" fmla="*/ 117160 w 288610"/>
-                    <a:gd name="connsiteY2" fmla="*/ 22318 h 489043"/>
-                    <a:gd name="connsiteX3" fmla="*/ 47310 w 288610"/>
-                    <a:gd name="connsiteY3" fmla="*/ 92168 h 489043"/>
-                    <a:gd name="connsiteX4" fmla="*/ 6035 w 288610"/>
-                    <a:gd name="connsiteY4" fmla="*/ 215993 h 489043"/>
-                    <a:gd name="connsiteX5" fmla="*/ 2860 w 288610"/>
-                    <a:gd name="connsiteY5" fmla="*/ 362043 h 489043"/>
-                    <a:gd name="connsiteX6" fmla="*/ 31435 w 288610"/>
-                    <a:gd name="connsiteY6" fmla="*/ 466818 h 489043"/>
-                    <a:gd name="connsiteX7" fmla="*/ 50485 w 288610"/>
-                    <a:gd name="connsiteY7" fmla="*/ 489043 h 489043"/>
-                  </a:gdLst>
-                  <a:ahLst/>
-                  <a:cxnLst>
-                    <a:cxn ang="0">
-                      <a:pos x="connsiteX0" y="connsiteY0"/>
-                    </a:cxn>
-                    <a:cxn ang="0">
-                      <a:pos x="connsiteX1" y="connsiteY1"/>
-                    </a:cxn>
-                    <a:cxn ang="0">
-                      <a:pos x="connsiteX2" y="connsiteY2"/>
-                    </a:cxn>
-                    <a:cxn ang="0">
-                      <a:pos x="connsiteX3" y="connsiteY3"/>
-                    </a:cxn>
-                    <a:cxn ang="0">
-                      <a:pos x="connsiteX4" y="connsiteY4"/>
-                    </a:cxn>
-                    <a:cxn ang="0">
-                      <a:pos x="connsiteX5" y="connsiteY5"/>
-                    </a:cxn>
-                    <a:cxn ang="0">
-                      <a:pos x="connsiteX6" y="connsiteY6"/>
-                    </a:cxn>
-                    <a:cxn ang="0">
-                      <a:pos x="connsiteX7" y="connsiteY7"/>
-                    </a:cxn>
-                  </a:cxnLst>
-                  <a:rect l="l" t="t" r="r" b="b"/>
-                  <a:pathLst>
-                    <a:path w="288610" h="489043">
-                      <a:moveTo>
-                        <a:pt x="288610" y="28668"/>
-                      </a:moveTo>
-                      <a:cubicBezTo>
-                        <a:pt x="266385" y="14909"/>
-                        <a:pt x="244160" y="1151"/>
-                        <a:pt x="215585" y="93"/>
-                      </a:cubicBezTo>
-                      <a:cubicBezTo>
-                        <a:pt x="187010" y="-965"/>
-                        <a:pt x="145206" y="6972"/>
-                        <a:pt x="117160" y="22318"/>
-                      </a:cubicBezTo>
-                      <a:cubicBezTo>
-                        <a:pt x="89114" y="37664"/>
-                        <a:pt x="65831" y="59889"/>
-                        <a:pt x="47310" y="92168"/>
-                      </a:cubicBezTo>
-                      <a:cubicBezTo>
-                        <a:pt x="28789" y="124447"/>
-                        <a:pt x="13443" y="171014"/>
-                        <a:pt x="6035" y="215993"/>
-                      </a:cubicBezTo>
-                      <a:cubicBezTo>
-                        <a:pt x="-1373" y="260972"/>
-                        <a:pt x="-1373" y="320239"/>
-                        <a:pt x="2860" y="362043"/>
-                      </a:cubicBezTo>
-                      <a:cubicBezTo>
-                        <a:pt x="7093" y="403847"/>
-                        <a:pt x="23497" y="445651"/>
-                        <a:pt x="31435" y="466818"/>
-                      </a:cubicBezTo>
-                      <a:cubicBezTo>
-                        <a:pt x="39372" y="487985"/>
-                        <a:pt x="46252" y="489043"/>
-                        <a:pt x="50485" y="489043"/>
-                      </a:cubicBezTo>
-                    </a:path>
-                  </a:pathLst>
-                </a:custGeom>
-                <a:grpFill/>
-                <a:ln>
-                  <a:solidFill>
-                    <a:schemeClr val="tx1"/>
-                  </a:solidFill>
-                </a:ln>
-              </p:spPr>
-              <p:style>
-                <a:lnRef idx="1">
-                  <a:schemeClr val="accent1"/>
-                </a:lnRef>
-                <a:fillRef idx="3">
-                  <a:schemeClr val="accent1"/>
-                </a:fillRef>
-                <a:effectRef idx="2">
-                  <a:schemeClr val="accent1"/>
-                </a:effectRef>
-                <a:fontRef idx="minor">
-                  <a:schemeClr val="lt1"/>
-                </a:fontRef>
-              </p:style>
-              <p:txBody>
-                <a:bodyPr rtlCol="0" anchor="ctr"/>
-                <a:lstStyle/>
-                <a:p>
-                  <a:pPr algn="ctr"/>
-                  <a:endParaRPr lang="en-US"/>
-                </a:p>
-              </p:txBody>
-            </p:sp>
-            <p:sp>
-              <p:nvSpPr>
-                <p:cNvPr id="56" name="Freeform 55"/>
-                <p:cNvSpPr/>
-                <p:nvPr/>
-              </p:nvSpPr>
-              <p:spPr>
-                <a:xfrm>
-                  <a:off x="2025650" y="1790624"/>
-                  <a:ext cx="302968" cy="447751"/>
-                </a:xfrm>
-                <a:custGeom>
-                  <a:avLst/>
-                  <a:gdLst>
-                    <a:gd name="connsiteX0" fmla="*/ 0 w 303458"/>
-                    <a:gd name="connsiteY0" fmla="*/ 32262 h 454537"/>
-                    <a:gd name="connsiteX1" fmla="*/ 66675 w 303458"/>
-                    <a:gd name="connsiteY1" fmla="*/ 512 h 454537"/>
-                    <a:gd name="connsiteX2" fmla="*/ 133350 w 303458"/>
-                    <a:gd name="connsiteY2" fmla="*/ 16387 h 454537"/>
-                    <a:gd name="connsiteX3" fmla="*/ 203200 w 303458"/>
-                    <a:gd name="connsiteY3" fmla="*/ 64012 h 454537"/>
-                    <a:gd name="connsiteX4" fmla="*/ 241300 w 303458"/>
-                    <a:gd name="connsiteY4" fmla="*/ 108462 h 454537"/>
-                    <a:gd name="connsiteX5" fmla="*/ 282575 w 303458"/>
-                    <a:gd name="connsiteY5" fmla="*/ 181487 h 454537"/>
-                    <a:gd name="connsiteX6" fmla="*/ 301625 w 303458"/>
-                    <a:gd name="connsiteY6" fmla="*/ 283087 h 454537"/>
-                    <a:gd name="connsiteX7" fmla="*/ 301625 w 303458"/>
-                    <a:gd name="connsiteY7" fmla="*/ 397387 h 454537"/>
-                    <a:gd name="connsiteX8" fmla="*/ 292100 w 303458"/>
-                    <a:gd name="connsiteY8" fmla="*/ 454537 h 454537"/>
-                    <a:gd name="connsiteX0" fmla="*/ 0 w 303458"/>
-                    <a:gd name="connsiteY0" fmla="*/ 31801 h 454076"/>
-                    <a:gd name="connsiteX1" fmla="*/ 66675 w 303458"/>
-                    <a:gd name="connsiteY1" fmla="*/ 51 h 454076"/>
-                    <a:gd name="connsiteX2" fmla="*/ 169069 w 303458"/>
-                    <a:gd name="connsiteY2" fmla="*/ 25451 h 454076"/>
-                    <a:gd name="connsiteX3" fmla="*/ 203200 w 303458"/>
-                    <a:gd name="connsiteY3" fmla="*/ 63551 h 454076"/>
-                    <a:gd name="connsiteX4" fmla="*/ 241300 w 303458"/>
-                    <a:gd name="connsiteY4" fmla="*/ 108001 h 454076"/>
-                    <a:gd name="connsiteX5" fmla="*/ 282575 w 303458"/>
-                    <a:gd name="connsiteY5" fmla="*/ 181026 h 454076"/>
-                    <a:gd name="connsiteX6" fmla="*/ 301625 w 303458"/>
-                    <a:gd name="connsiteY6" fmla="*/ 282626 h 454076"/>
-                    <a:gd name="connsiteX7" fmla="*/ 301625 w 303458"/>
-                    <a:gd name="connsiteY7" fmla="*/ 396926 h 454076"/>
-                    <a:gd name="connsiteX8" fmla="*/ 292100 w 303458"/>
-                    <a:gd name="connsiteY8" fmla="*/ 454076 h 454076"/>
-                    <a:gd name="connsiteX0" fmla="*/ 0 w 303458"/>
-                    <a:gd name="connsiteY0" fmla="*/ 31804 h 454079"/>
-                    <a:gd name="connsiteX1" fmla="*/ 66675 w 303458"/>
-                    <a:gd name="connsiteY1" fmla="*/ 54 h 454079"/>
-                    <a:gd name="connsiteX2" fmla="*/ 169069 w 303458"/>
-                    <a:gd name="connsiteY2" fmla="*/ 25454 h 454079"/>
-                    <a:gd name="connsiteX3" fmla="*/ 217487 w 303458"/>
-                    <a:gd name="connsiteY3" fmla="*/ 70698 h 454079"/>
-                    <a:gd name="connsiteX4" fmla="*/ 241300 w 303458"/>
-                    <a:gd name="connsiteY4" fmla="*/ 108004 h 454079"/>
-                    <a:gd name="connsiteX5" fmla="*/ 282575 w 303458"/>
-                    <a:gd name="connsiteY5" fmla="*/ 181029 h 454079"/>
-                    <a:gd name="connsiteX6" fmla="*/ 301625 w 303458"/>
-                    <a:gd name="connsiteY6" fmla="*/ 282629 h 454079"/>
-                    <a:gd name="connsiteX7" fmla="*/ 301625 w 303458"/>
-                    <a:gd name="connsiteY7" fmla="*/ 396929 h 454079"/>
-                    <a:gd name="connsiteX8" fmla="*/ 292100 w 303458"/>
-                    <a:gd name="connsiteY8" fmla="*/ 454079 h 454079"/>
-                    <a:gd name="connsiteX0" fmla="*/ 0 w 303458"/>
-                    <a:gd name="connsiteY0" fmla="*/ 31804 h 454079"/>
-                    <a:gd name="connsiteX1" fmla="*/ 66675 w 303458"/>
-                    <a:gd name="connsiteY1" fmla="*/ 54 h 454079"/>
-                    <a:gd name="connsiteX2" fmla="*/ 169069 w 303458"/>
-                    <a:gd name="connsiteY2" fmla="*/ 25454 h 454079"/>
-                    <a:gd name="connsiteX3" fmla="*/ 217487 w 303458"/>
-                    <a:gd name="connsiteY3" fmla="*/ 70698 h 454079"/>
-                    <a:gd name="connsiteX4" fmla="*/ 250825 w 303458"/>
-                    <a:gd name="connsiteY4" fmla="*/ 110386 h 454079"/>
-                    <a:gd name="connsiteX5" fmla="*/ 282575 w 303458"/>
-                    <a:gd name="connsiteY5" fmla="*/ 181029 h 454079"/>
-                    <a:gd name="connsiteX6" fmla="*/ 301625 w 303458"/>
-                    <a:gd name="connsiteY6" fmla="*/ 282629 h 454079"/>
-                    <a:gd name="connsiteX7" fmla="*/ 301625 w 303458"/>
-                    <a:gd name="connsiteY7" fmla="*/ 396929 h 454079"/>
-                    <a:gd name="connsiteX8" fmla="*/ 292100 w 303458"/>
-                    <a:gd name="connsiteY8" fmla="*/ 454079 h 454079"/>
-                    <a:gd name="connsiteX0" fmla="*/ 0 w 303458"/>
-                    <a:gd name="connsiteY0" fmla="*/ 31804 h 454079"/>
-                    <a:gd name="connsiteX1" fmla="*/ 66675 w 303458"/>
-                    <a:gd name="connsiteY1" fmla="*/ 54 h 454079"/>
-                    <a:gd name="connsiteX2" fmla="*/ 169069 w 303458"/>
-                    <a:gd name="connsiteY2" fmla="*/ 25454 h 454079"/>
-                    <a:gd name="connsiteX3" fmla="*/ 227012 w 303458"/>
-                    <a:gd name="connsiteY3" fmla="*/ 70698 h 454079"/>
-                    <a:gd name="connsiteX4" fmla="*/ 250825 w 303458"/>
-                    <a:gd name="connsiteY4" fmla="*/ 110386 h 454079"/>
-                    <a:gd name="connsiteX5" fmla="*/ 282575 w 303458"/>
-                    <a:gd name="connsiteY5" fmla="*/ 181029 h 454079"/>
-                    <a:gd name="connsiteX6" fmla="*/ 301625 w 303458"/>
-                    <a:gd name="connsiteY6" fmla="*/ 282629 h 454079"/>
-                    <a:gd name="connsiteX7" fmla="*/ 301625 w 303458"/>
-                    <a:gd name="connsiteY7" fmla="*/ 396929 h 454079"/>
-                    <a:gd name="connsiteX8" fmla="*/ 292100 w 303458"/>
-                    <a:gd name="connsiteY8" fmla="*/ 454079 h 454079"/>
-                    <a:gd name="connsiteX0" fmla="*/ 0 w 302968"/>
-                    <a:gd name="connsiteY0" fmla="*/ 31804 h 454079"/>
-                    <a:gd name="connsiteX1" fmla="*/ 66675 w 302968"/>
-                    <a:gd name="connsiteY1" fmla="*/ 54 h 454079"/>
-                    <a:gd name="connsiteX2" fmla="*/ 169069 w 302968"/>
-                    <a:gd name="connsiteY2" fmla="*/ 25454 h 454079"/>
-                    <a:gd name="connsiteX3" fmla="*/ 227012 w 302968"/>
-                    <a:gd name="connsiteY3" fmla="*/ 70698 h 454079"/>
-                    <a:gd name="connsiteX4" fmla="*/ 250825 w 302968"/>
-                    <a:gd name="connsiteY4" fmla="*/ 110386 h 454079"/>
-                    <a:gd name="connsiteX5" fmla="*/ 289719 w 302968"/>
-                    <a:gd name="connsiteY5" fmla="*/ 181029 h 454079"/>
-                    <a:gd name="connsiteX6" fmla="*/ 301625 w 302968"/>
-                    <a:gd name="connsiteY6" fmla="*/ 282629 h 454079"/>
-                    <a:gd name="connsiteX7" fmla="*/ 301625 w 302968"/>
-                    <a:gd name="connsiteY7" fmla="*/ 396929 h 454079"/>
-                    <a:gd name="connsiteX8" fmla="*/ 292100 w 302968"/>
-                    <a:gd name="connsiteY8" fmla="*/ 454079 h 454079"/>
-                    <a:gd name="connsiteX0" fmla="*/ 0 w 302968"/>
-                    <a:gd name="connsiteY0" fmla="*/ 31804 h 454079"/>
-                    <a:gd name="connsiteX1" fmla="*/ 66675 w 302968"/>
-                    <a:gd name="connsiteY1" fmla="*/ 54 h 454079"/>
-                    <a:gd name="connsiteX2" fmla="*/ 169069 w 302968"/>
-                    <a:gd name="connsiteY2" fmla="*/ 25454 h 454079"/>
-                    <a:gd name="connsiteX3" fmla="*/ 227012 w 302968"/>
-                    <a:gd name="connsiteY3" fmla="*/ 70698 h 454079"/>
-                    <a:gd name="connsiteX4" fmla="*/ 257969 w 302968"/>
-                    <a:gd name="connsiteY4" fmla="*/ 110386 h 454079"/>
-                    <a:gd name="connsiteX5" fmla="*/ 289719 w 302968"/>
-                    <a:gd name="connsiteY5" fmla="*/ 181029 h 454079"/>
-                    <a:gd name="connsiteX6" fmla="*/ 301625 w 302968"/>
-                    <a:gd name="connsiteY6" fmla="*/ 282629 h 454079"/>
-                    <a:gd name="connsiteX7" fmla="*/ 301625 w 302968"/>
-                    <a:gd name="connsiteY7" fmla="*/ 396929 h 454079"/>
-                    <a:gd name="connsiteX8" fmla="*/ 292100 w 302968"/>
-                    <a:gd name="connsiteY8" fmla="*/ 454079 h 454079"/>
-                    <a:gd name="connsiteX0" fmla="*/ 0 w 302968"/>
-                    <a:gd name="connsiteY0" fmla="*/ 31802 h 454077"/>
-                    <a:gd name="connsiteX1" fmla="*/ 66675 w 302968"/>
-                    <a:gd name="connsiteY1" fmla="*/ 52 h 454077"/>
-                    <a:gd name="connsiteX2" fmla="*/ 169069 w 302968"/>
-                    <a:gd name="connsiteY2" fmla="*/ 25452 h 454077"/>
-                    <a:gd name="connsiteX3" fmla="*/ 231774 w 302968"/>
-                    <a:gd name="connsiteY3" fmla="*/ 65934 h 454077"/>
-                    <a:gd name="connsiteX4" fmla="*/ 257969 w 302968"/>
-                    <a:gd name="connsiteY4" fmla="*/ 110384 h 454077"/>
-                    <a:gd name="connsiteX5" fmla="*/ 289719 w 302968"/>
-                    <a:gd name="connsiteY5" fmla="*/ 181027 h 454077"/>
-                    <a:gd name="connsiteX6" fmla="*/ 301625 w 302968"/>
-                    <a:gd name="connsiteY6" fmla="*/ 282627 h 454077"/>
-                    <a:gd name="connsiteX7" fmla="*/ 301625 w 302968"/>
-                    <a:gd name="connsiteY7" fmla="*/ 396927 h 454077"/>
-                    <a:gd name="connsiteX8" fmla="*/ 292100 w 302968"/>
-                    <a:gd name="connsiteY8" fmla="*/ 454077 h 454077"/>
-                    <a:gd name="connsiteX0" fmla="*/ 0 w 302968"/>
-                    <a:gd name="connsiteY0" fmla="*/ 31802 h 454077"/>
-                    <a:gd name="connsiteX1" fmla="*/ 66675 w 302968"/>
-                    <a:gd name="connsiteY1" fmla="*/ 52 h 454077"/>
-                    <a:gd name="connsiteX2" fmla="*/ 169069 w 302968"/>
-                    <a:gd name="connsiteY2" fmla="*/ 25452 h 454077"/>
-                    <a:gd name="connsiteX3" fmla="*/ 231774 w 302968"/>
-                    <a:gd name="connsiteY3" fmla="*/ 65934 h 454077"/>
-                    <a:gd name="connsiteX4" fmla="*/ 272256 w 302968"/>
-                    <a:gd name="connsiteY4" fmla="*/ 112765 h 454077"/>
-                    <a:gd name="connsiteX5" fmla="*/ 289719 w 302968"/>
-                    <a:gd name="connsiteY5" fmla="*/ 181027 h 454077"/>
-                    <a:gd name="connsiteX6" fmla="*/ 301625 w 302968"/>
-                    <a:gd name="connsiteY6" fmla="*/ 282627 h 454077"/>
-                    <a:gd name="connsiteX7" fmla="*/ 301625 w 302968"/>
-                    <a:gd name="connsiteY7" fmla="*/ 396927 h 454077"/>
-                    <a:gd name="connsiteX8" fmla="*/ 292100 w 302968"/>
-                    <a:gd name="connsiteY8" fmla="*/ 454077 h 454077"/>
-                    <a:gd name="connsiteX0" fmla="*/ 0 w 302968"/>
-                    <a:gd name="connsiteY0" fmla="*/ 31802 h 454077"/>
-                    <a:gd name="connsiteX1" fmla="*/ 66675 w 302968"/>
-                    <a:gd name="connsiteY1" fmla="*/ 52 h 454077"/>
-                    <a:gd name="connsiteX2" fmla="*/ 169069 w 302968"/>
-                    <a:gd name="connsiteY2" fmla="*/ 25452 h 454077"/>
-                    <a:gd name="connsiteX3" fmla="*/ 231774 w 302968"/>
-                    <a:gd name="connsiteY3" fmla="*/ 65934 h 454077"/>
-                    <a:gd name="connsiteX4" fmla="*/ 272256 w 302968"/>
-                    <a:gd name="connsiteY4" fmla="*/ 122290 h 454077"/>
-                    <a:gd name="connsiteX5" fmla="*/ 289719 w 302968"/>
-                    <a:gd name="connsiteY5" fmla="*/ 181027 h 454077"/>
-                    <a:gd name="connsiteX6" fmla="*/ 301625 w 302968"/>
-                    <a:gd name="connsiteY6" fmla="*/ 282627 h 454077"/>
-                    <a:gd name="connsiteX7" fmla="*/ 301625 w 302968"/>
-                    <a:gd name="connsiteY7" fmla="*/ 396927 h 454077"/>
-                    <a:gd name="connsiteX8" fmla="*/ 292100 w 302968"/>
-                    <a:gd name="connsiteY8" fmla="*/ 454077 h 454077"/>
-                    <a:gd name="connsiteX0" fmla="*/ 0 w 302968"/>
-                    <a:gd name="connsiteY0" fmla="*/ 25476 h 447751"/>
-                    <a:gd name="connsiteX1" fmla="*/ 73025 w 302968"/>
-                    <a:gd name="connsiteY1" fmla="*/ 76 h 447751"/>
-                    <a:gd name="connsiteX2" fmla="*/ 169069 w 302968"/>
-                    <a:gd name="connsiteY2" fmla="*/ 19126 h 447751"/>
-                    <a:gd name="connsiteX3" fmla="*/ 231774 w 302968"/>
-                    <a:gd name="connsiteY3" fmla="*/ 59608 h 447751"/>
-                    <a:gd name="connsiteX4" fmla="*/ 272256 w 302968"/>
-                    <a:gd name="connsiteY4" fmla="*/ 115964 h 447751"/>
-                    <a:gd name="connsiteX5" fmla="*/ 289719 w 302968"/>
-                    <a:gd name="connsiteY5" fmla="*/ 174701 h 447751"/>
-                    <a:gd name="connsiteX6" fmla="*/ 301625 w 302968"/>
-                    <a:gd name="connsiteY6" fmla="*/ 276301 h 447751"/>
-                    <a:gd name="connsiteX7" fmla="*/ 301625 w 302968"/>
-                    <a:gd name="connsiteY7" fmla="*/ 390601 h 447751"/>
-                    <a:gd name="connsiteX8" fmla="*/ 292100 w 302968"/>
-                    <a:gd name="connsiteY8" fmla="*/ 447751 h 447751"/>
-                  </a:gdLst>
-                  <a:ahLst/>
-                  <a:cxnLst>
-                    <a:cxn ang="0">
-                      <a:pos x="connsiteX0" y="connsiteY0"/>
-                    </a:cxn>
-                    <a:cxn ang="0">
-                      <a:pos x="connsiteX1" y="connsiteY1"/>
-                    </a:cxn>
-                    <a:cxn ang="0">
-                      <a:pos x="connsiteX2" y="connsiteY2"/>
-                    </a:cxn>
-                    <a:cxn ang="0">
-                      <a:pos x="connsiteX3" y="connsiteY3"/>
-                    </a:cxn>
-                    <a:cxn ang="0">
-                      <a:pos x="connsiteX4" y="connsiteY4"/>
-                    </a:cxn>
-                    <a:cxn ang="0">
-                      <a:pos x="connsiteX5" y="connsiteY5"/>
-                    </a:cxn>
-                    <a:cxn ang="0">
-                      <a:pos x="connsiteX6" y="connsiteY6"/>
-                    </a:cxn>
-                    <a:cxn ang="0">
-                      <a:pos x="connsiteX7" y="connsiteY7"/>
-                    </a:cxn>
-                    <a:cxn ang="0">
-                      <a:pos x="connsiteX8" y="connsiteY8"/>
-                    </a:cxn>
-                  </a:cxnLst>
-                  <a:rect l="l" t="t" r="r" b="b"/>
-                  <a:pathLst>
-                    <a:path w="302968" h="447751">
-                      <a:moveTo>
-                        <a:pt x="0" y="25476"/>
-                      </a:moveTo>
-                      <a:cubicBezTo>
-                        <a:pt x="22225" y="10924"/>
-                        <a:pt x="44847" y="1134"/>
-                        <a:pt x="73025" y="76"/>
-                      </a:cubicBezTo>
-                      <a:cubicBezTo>
-                        <a:pt x="101203" y="-982"/>
-                        <a:pt x="142611" y="9204"/>
-                        <a:pt x="169069" y="19126"/>
-                      </a:cubicBezTo>
-                      <a:cubicBezTo>
-                        <a:pt x="195527" y="29048"/>
-                        <a:pt x="214576" y="43468"/>
-                        <a:pt x="231774" y="59608"/>
-                      </a:cubicBezTo>
-                      <a:cubicBezTo>
-                        <a:pt x="248972" y="75748"/>
-                        <a:pt x="262598" y="96782"/>
-                        <a:pt x="272256" y="115964"/>
-                      </a:cubicBezTo>
-                      <a:cubicBezTo>
-                        <a:pt x="281914" y="135146"/>
-                        <a:pt x="284824" y="147978"/>
-                        <a:pt x="289719" y="174701"/>
-                      </a:cubicBezTo>
-                      <a:cubicBezTo>
-                        <a:pt x="294614" y="201424"/>
-                        <a:pt x="299641" y="240318"/>
-                        <a:pt x="301625" y="276301"/>
-                      </a:cubicBezTo>
-                      <a:cubicBezTo>
-                        <a:pt x="303609" y="312284"/>
-                        <a:pt x="303213" y="362026"/>
-                        <a:pt x="301625" y="390601"/>
-                      </a:cubicBezTo>
-                      <a:cubicBezTo>
-                        <a:pt x="300038" y="419176"/>
-                        <a:pt x="296069" y="433463"/>
-                        <a:pt x="292100" y="447751"/>
-                      </a:cubicBezTo>
-                    </a:path>
-                  </a:pathLst>
-                </a:custGeom>
-                <a:grpFill/>
-                <a:ln>
-                  <a:solidFill>
-                    <a:schemeClr val="tx1"/>
-                  </a:solidFill>
-                </a:ln>
-              </p:spPr>
-              <p:style>
-                <a:lnRef idx="1">
-                  <a:schemeClr val="accent1"/>
-                </a:lnRef>
-                <a:fillRef idx="3">
-                  <a:schemeClr val="accent1"/>
-                </a:fillRef>
-                <a:effectRef idx="2">
-                  <a:schemeClr val="accent1"/>
-                </a:effectRef>
-                <a:fontRef idx="minor">
-                  <a:schemeClr val="lt1"/>
-                </a:fontRef>
-              </p:style>
-              <p:txBody>
-                <a:bodyPr rtlCol="0" anchor="ctr"/>
-                <a:lstStyle/>
-                <a:p>
-                  <a:pPr algn="ctr"/>
-                  <a:endParaRPr lang="en-US"/>
-                </a:p>
-              </p:txBody>
-            </p:sp>
-          </p:grpSp>
-          <p:sp>
-            <p:nvSpPr>
-              <p:cNvPr id="50" name="Oval 49"/>
-              <p:cNvSpPr/>
-              <p:nvPr/>
-            </p:nvSpPr>
-            <p:spPr>
-              <a:xfrm>
-                <a:off x="1888733" y="1828800"/>
-                <a:ext cx="407849" cy="416030"/>
-              </a:xfrm>
-              <a:prstGeom prst="ellipse">
-                <a:avLst/>
-              </a:prstGeom>
-            </p:spPr>
-            <p:style>
-              <a:lnRef idx="2">
-                <a:schemeClr val="dk1"/>
-              </a:lnRef>
-              <a:fillRef idx="1">
-                <a:schemeClr val="lt1"/>
-              </a:fillRef>
-              <a:effectRef idx="0">
-                <a:schemeClr val="dk1"/>
-              </a:effectRef>
-              <a:fontRef idx="minor">
-                <a:schemeClr val="dk1"/>
-              </a:fontRef>
-            </p:style>
-            <p:txBody>
-              <a:bodyPr rtlCol="0" anchor="ctr"/>
-              <a:lstStyle/>
-              <a:p>
-                <a:pPr algn="ctr"/>
-                <a:endParaRPr lang="en-US" sz="2200" dirty="0">
-                  <a:latin typeface="小塚ゴシック Pro L" pitchFamily="34" charset="-128"/>
-                  <a:ea typeface="小塚ゴシック Pro L" pitchFamily="34" charset="-128"/>
-                </a:endParaRPr>
-              </a:p>
-            </p:txBody>
-          </p:sp>
-          <p:cxnSp>
-            <p:nvCxnSpPr>
-              <p:cNvPr id="51" name="Straight Connector 50"/>
-              <p:cNvCxnSpPr>
-                <a:stCxn id="50" idx="4"/>
-              </p:cNvCxnSpPr>
-              <p:nvPr/>
-            </p:nvCxnSpPr>
-            <p:spPr>
-              <a:xfrm>
-                <a:off x="2092658" y="2244830"/>
-                <a:ext cx="4153" cy="501005"/>
-              </a:xfrm>
-              <a:prstGeom prst="line">
-                <a:avLst/>
-              </a:prstGeom>
-            </p:spPr>
-            <p:style>
-              <a:lnRef idx="2">
-                <a:schemeClr val="dk1"/>
-              </a:lnRef>
-              <a:fillRef idx="1">
-                <a:schemeClr val="lt1"/>
-              </a:fillRef>
-              <a:effectRef idx="0">
-                <a:schemeClr val="dk1"/>
-              </a:effectRef>
-              <a:fontRef idx="minor">
-                <a:schemeClr val="dk1"/>
-              </a:fontRef>
-            </p:style>
-          </p:cxnSp>
-          <p:cxnSp>
-            <p:nvCxnSpPr>
-              <p:cNvPr id="52" name="Straight Connector 51"/>
-              <p:cNvCxnSpPr/>
-              <p:nvPr/>
-            </p:nvCxnSpPr>
-            <p:spPr>
-              <a:xfrm>
-                <a:off x="1661135" y="2338519"/>
-                <a:ext cx="871351" cy="0"/>
-              </a:xfrm>
-              <a:prstGeom prst="line">
-                <a:avLst/>
-              </a:prstGeom>
-            </p:spPr>
-            <p:style>
-              <a:lnRef idx="2">
-                <a:schemeClr val="dk1"/>
-              </a:lnRef>
-              <a:fillRef idx="1">
-                <a:schemeClr val="lt1"/>
-              </a:fillRef>
-              <a:effectRef idx="0">
-                <a:schemeClr val="dk1"/>
-              </a:effectRef>
-              <a:fontRef idx="minor">
-                <a:schemeClr val="dk1"/>
-              </a:fontRef>
-            </p:style>
-          </p:cxnSp>
-          <p:cxnSp>
-            <p:nvCxnSpPr>
-              <p:cNvPr id="53" name="Straight Connector 52"/>
-              <p:cNvCxnSpPr/>
-              <p:nvPr/>
-            </p:nvCxnSpPr>
-            <p:spPr>
-              <a:xfrm>
-                <a:off x="2096811" y="2745835"/>
-                <a:ext cx="215969" cy="407316"/>
-              </a:xfrm>
-              <a:prstGeom prst="line">
-                <a:avLst/>
-              </a:prstGeom>
-            </p:spPr>
-            <p:style>
-              <a:lnRef idx="2">
-                <a:schemeClr val="dk1"/>
-              </a:lnRef>
-              <a:fillRef idx="1">
-                <a:schemeClr val="lt1"/>
-              </a:fillRef>
-              <a:effectRef idx="0">
-                <a:schemeClr val="dk1"/>
-              </a:effectRef>
-              <a:fontRef idx="minor">
-                <a:schemeClr val="dk1"/>
-              </a:fontRef>
-            </p:style>
-          </p:cxnSp>
-          <p:cxnSp>
-            <p:nvCxnSpPr>
-              <p:cNvPr id="54" name="Straight Connector 53"/>
-              <p:cNvCxnSpPr/>
-              <p:nvPr/>
-            </p:nvCxnSpPr>
-            <p:spPr>
-              <a:xfrm flipH="1">
-                <a:off x="1801100" y="2745835"/>
-                <a:ext cx="295711" cy="407316"/>
-              </a:xfrm>
-              <a:prstGeom prst="line">
-                <a:avLst/>
-              </a:prstGeom>
-            </p:spPr>
-            <p:style>
-              <a:lnRef idx="2">
-                <a:schemeClr val="dk1"/>
-              </a:lnRef>
-              <a:fillRef idx="1">
-                <a:schemeClr val="lt1"/>
-              </a:fillRef>
-              <a:effectRef idx="0">
-                <a:schemeClr val="dk1"/>
-              </a:effectRef>
-              <a:fontRef idx="minor">
-                <a:schemeClr val="dk1"/>
-              </a:fontRef>
-            </p:style>
-          </p:cxnSp>
-        </p:grpSp>
-        <p:sp>
-          <p:nvSpPr>
-            <p:cNvPr id="43" name="TextBox 42"/>
-            <p:cNvSpPr txBox="1"/>
-            <p:nvPr/>
-          </p:nvSpPr>
-          <p:spPr>
-            <a:xfrm>
-              <a:off x="1442113" y="3229642"/>
-              <a:ext cx="1301087" cy="430887"/>
-            </a:xfrm>
-            <a:prstGeom prst="rect">
-              <a:avLst/>
-            </a:prstGeom>
-            <a:noFill/>
-          </p:spPr>
-          <p:txBody>
-            <a:bodyPr wrap="square" rtlCol="0">
-              <a:spAutoFit/>
-            </a:bodyPr>
-            <a:lstStyle/>
-            <a:p>
-              <a:pPr algn="ctr"/>
-              <a:r>
-                <a:rPr lang="en-US" sz="2200" dirty="0" smtClean="0">
-                  <a:latin typeface="小塚ゴシック Pro L" pitchFamily="34" charset="-128"/>
-                  <a:ea typeface="小塚ゴシック Pro L" pitchFamily="34" charset="-128"/>
-                </a:rPr>
-                <a:t>Sarah</a:t>
-              </a:r>
-              <a:endParaRPr lang="en-US" sz="2200" dirty="0">
-                <a:latin typeface="小塚ゴシック Pro L" pitchFamily="34" charset="-128"/>
-                <a:ea typeface="小塚ゴシック Pro L" pitchFamily="34" charset="-128"/>
-              </a:endParaRPr>
-            </a:p>
-          </p:txBody>
-        </p:sp>
-        <p:sp>
-          <p:nvSpPr>
-            <p:cNvPr id="44" name="Arc 43"/>
-            <p:cNvSpPr/>
-            <p:nvPr/>
-          </p:nvSpPr>
-          <p:spPr>
-            <a:xfrm rot="2630965">
-              <a:off x="1732823" y="1703234"/>
-              <a:ext cx="249193" cy="505348"/>
-            </a:xfrm>
-            <a:prstGeom prst="arc">
-              <a:avLst>
-                <a:gd name="adj1" fmla="val 16901399"/>
-                <a:gd name="adj2" fmla="val 1606316"/>
-              </a:avLst>
-            </a:prstGeom>
-            <a:solidFill>
-              <a:schemeClr val="tx1"/>
-            </a:solidFill>
-            <a:ln>
-              <a:solidFill>
-                <a:schemeClr val="tx1"/>
-              </a:solidFill>
-            </a:ln>
-          </p:spPr>
-          <p:style>
-            <a:lnRef idx="2">
-              <a:schemeClr val="accent1"/>
-            </a:lnRef>
-            <a:fillRef idx="0">
-              <a:schemeClr val="accent1"/>
-            </a:fillRef>
-            <a:effectRef idx="1">
-              <a:schemeClr val="accent1"/>
-            </a:effectRef>
-            <a:fontRef idx="minor">
-              <a:schemeClr val="tx1"/>
-            </a:fontRef>
-          </p:style>
-          <p:txBody>
-            <a:bodyPr rtlCol="0" anchor="ctr"/>
-            <a:lstStyle/>
-            <a:p>
-              <a:pPr algn="ctr"/>
-              <a:endParaRPr lang="en-US"/>
-            </a:p>
-          </p:txBody>
-        </p:sp>
-      </p:grpSp>
-    </p:spTree>
-    <p:extLst>
-      <p:ext uri="{BB962C8B-B14F-4D97-AF65-F5344CB8AC3E}">
-        <p14:creationId xmlns:p14="http://schemas.microsoft.com/office/powerpoint/2010/main" val="3158077277"/>
-      </p:ext>
-    </p:extLst>
-  </p:cSld>
-  <p:clrMapOvr>
-    <a:masterClrMapping/>
-  </p:clrMapOvr>
-  <p:timing>
-    <p:tnLst>
-      <p:par>
-        <p:cTn id="1" dur="indefinite" restart="never" nodeType="tmRoot"/>
-      </p:par>
-    </p:tnLst>
-  </p:timing>
-</p:sld>
-</file>
-
-<file path=ppt/slides/slide11.xml><?xml version="1.0" encoding="utf-8"?>
-<p:sld xmlns:a="http://schemas.openxmlformats.org/drawingml/2006/main" xmlns:r="http://schemas.openxmlformats.org/officeDocument/2006/relationships" xmlns:p="http://schemas.openxmlformats.org/presentationml/2006/main">
-  <p:cSld>
-    <p:spTree>
-      <p:nvGrpSpPr>
-        <p:cNvPr id="1" name=""/>
-        <p:cNvGrpSpPr/>
-        <p:nvPr/>
-      </p:nvGrpSpPr>
-      <p:grpSpPr>
-        <a:xfrm>
-          <a:off x="0" y="0"/>
-          <a:ext cx="0" cy="0"/>
-          <a:chOff x="0" y="0"/>
-          <a:chExt cx="0" cy="0"/>
-        </a:xfrm>
-      </p:grpSpPr>
-      <p:sp>
-        <p:nvSpPr>
-          <p:cNvPr id="7" name="Cloud 6"/>
-          <p:cNvSpPr/>
-          <p:nvPr/>
-        </p:nvSpPr>
-        <p:spPr>
-          <a:xfrm>
-            <a:off x="5181600" y="3302330"/>
-            <a:ext cx="2362200" cy="1371600"/>
-          </a:xfrm>
-          <a:prstGeom prst="cloud">
-            <a:avLst/>
-          </a:prstGeom>
-        </p:spPr>
-        <p:style>
-          <a:lnRef idx="1">
-            <a:schemeClr val="accent1"/>
-          </a:lnRef>
-          <a:fillRef idx="3">
-            <a:schemeClr val="accent1"/>
-          </a:fillRef>
-          <a:effectRef idx="2">
-            <a:schemeClr val="accent1"/>
-          </a:effectRef>
-          <a:fontRef idx="minor">
-            <a:schemeClr val="lt1"/>
-          </a:fontRef>
-        </p:style>
-        <p:txBody>
-          <a:bodyPr rtlCol="0" anchor="ctr"/>
-          <a:lstStyle/>
-          <a:p>
-            <a:pPr algn="ctr"/>
-            <a:endParaRPr lang="en-US" sz="2200" dirty="0">
-              <a:effectLst>
-                <a:outerShdw blurRad="50800" dist="38100" dir="2700000" algn="tl" rotWithShape="0">
-                  <a:prstClr val="black">
-                    <a:alpha val="40000"/>
-                  </a:prstClr>
-                </a:outerShdw>
-              </a:effectLst>
-              <a:latin typeface="小塚ゴシック Pro L" pitchFamily="34" charset="-128"/>
-              <a:ea typeface="小塚ゴシック Pro L" pitchFamily="34" charset="-128"/>
-            </a:endParaRPr>
-          </a:p>
-        </p:txBody>
-      </p:sp>
-      <p:sp>
-        <p:nvSpPr>
-          <p:cNvPr id="61" name="Rectangle 60"/>
-          <p:cNvSpPr/>
-          <p:nvPr/>
-        </p:nvSpPr>
-        <p:spPr>
-          <a:xfrm>
-            <a:off x="533400" y="3988130"/>
-            <a:ext cx="8153400" cy="2641270"/>
-          </a:xfrm>
-          <a:prstGeom prst="rect">
-            <a:avLst/>
-          </a:prstGeom>
-          <a:solidFill>
-            <a:srgbClr val="00FF00">
-              <a:alpha val="23922"/>
-            </a:srgbClr>
-          </a:solidFill>
-          <a:ln>
-            <a:noFill/>
-          </a:ln>
-        </p:spPr>
-        <p:style>
-          <a:lnRef idx="1">
-            <a:schemeClr val="accent3"/>
-          </a:lnRef>
-          <a:fillRef idx="3">
-            <a:schemeClr val="accent3"/>
-          </a:fillRef>
-          <a:effectRef idx="2">
-            <a:schemeClr val="accent3"/>
-          </a:effectRef>
-          <a:fontRef idx="minor">
-            <a:schemeClr val="lt1"/>
-          </a:fontRef>
-        </p:style>
-        <p:txBody>
-          <a:bodyPr rtlCol="0" anchor="ctr"/>
-          <a:lstStyle/>
-          <a:p>
-            <a:pPr algn="ctr"/>
-            <a:endParaRPr lang="en-US"/>
-          </a:p>
-        </p:txBody>
-      </p:sp>
-      <p:sp>
-        <p:nvSpPr>
-          <p:cNvPr id="9" name="Oval 8"/>
-          <p:cNvSpPr/>
-          <p:nvPr/>
-        </p:nvSpPr>
-        <p:spPr>
-          <a:xfrm>
-            <a:off x="5230338" y="5283530"/>
-            <a:ext cx="2247900" cy="1230086"/>
-          </a:xfrm>
-          <a:prstGeom prst="ellipse">
-            <a:avLst/>
-          </a:prstGeom>
-        </p:spPr>
-        <p:style>
-          <a:lnRef idx="1">
-            <a:schemeClr val="accent2"/>
-          </a:lnRef>
-          <a:fillRef idx="3">
-            <a:schemeClr val="accent2"/>
-          </a:fillRef>
-          <a:effectRef idx="2">
-            <a:schemeClr val="accent2"/>
-          </a:effectRef>
-          <a:fontRef idx="minor">
-            <a:schemeClr val="lt1"/>
-          </a:fontRef>
-        </p:style>
-        <p:txBody>
-          <a:bodyPr rtlCol="0" anchor="ctr"/>
-          <a:lstStyle/>
-          <a:p>
-            <a:pPr algn="ctr"/>
-            <a:r>
-              <a:rPr lang="en-US" sz="2200" dirty="0" err="1" smtClean="0">
-                <a:effectLst>
-                  <a:outerShdw blurRad="50800" dist="38100" dir="2700000" algn="tl" rotWithShape="0">
-                    <a:prstClr val="black">
-                      <a:alpha val="40000"/>
-                    </a:prstClr>
-                  </a:outerShdw>
-                </a:effectLst>
-                <a:latin typeface="小塚ゴシック Pro L" pitchFamily="34" charset="-128"/>
-                <a:ea typeface="小塚ゴシック Pro L" pitchFamily="34" charset="-128"/>
-              </a:rPr>
-              <a:t>FileIO</a:t>
-            </a:r>
-            <a:r>
-              <a:rPr lang="en-US" sz="2200" dirty="0" smtClean="0">
-                <a:effectLst>
-                  <a:outerShdw blurRad="50800" dist="38100" dir="2700000" algn="tl" rotWithShape="0">
-                    <a:prstClr val="black">
-                      <a:alpha val="40000"/>
-                    </a:prstClr>
-                  </a:outerShdw>
-                </a:effectLst>
-                <a:latin typeface="小塚ゴシック Pro L" pitchFamily="34" charset="-128"/>
-                <a:ea typeface="小塚ゴシック Pro L" pitchFamily="34" charset="-128"/>
-              </a:rPr>
-              <a:t>:: write()</a:t>
-            </a:r>
-            <a:endParaRPr lang="en-US" sz="2200" dirty="0">
-              <a:effectLst>
-                <a:outerShdw blurRad="50800" dist="38100" dir="2700000" algn="tl" rotWithShape="0">
-                  <a:prstClr val="black">
-                    <a:alpha val="40000"/>
-                  </a:prstClr>
-                </a:outerShdw>
-              </a:effectLst>
-              <a:latin typeface="小塚ゴシック Pro L" pitchFamily="34" charset="-128"/>
-              <a:ea typeface="小塚ゴシック Pro L" pitchFamily="34" charset="-128"/>
-            </a:endParaRPr>
-          </a:p>
-        </p:txBody>
-      </p:sp>
-      <p:sp>
-        <p:nvSpPr>
-          <p:cNvPr id="2" name="Title 1"/>
-          <p:cNvSpPr>
-            <a:spLocks noGrp="1"/>
-          </p:cNvSpPr>
-          <p:nvPr>
-            <p:ph type="title"/>
-          </p:nvPr>
-        </p:nvSpPr>
-        <p:spPr/>
-        <p:txBody>
-          <a:bodyPr/>
-          <a:lstStyle/>
-          <a:p>
-            <a:r>
-              <a:rPr lang="en-US" dirty="0" smtClean="0"/>
-              <a:t>Scenario #2</a:t>
-            </a:r>
-            <a:endParaRPr lang="en-US" dirty="0"/>
-          </a:p>
-        </p:txBody>
-      </p:sp>
-      <p:sp>
-        <p:nvSpPr>
-          <p:cNvPr id="5" name="Rounded Rectangle 4"/>
-          <p:cNvSpPr/>
-          <p:nvPr/>
-        </p:nvSpPr>
-        <p:spPr>
-          <a:xfrm>
-            <a:off x="5325588" y="1549730"/>
-            <a:ext cx="2057400" cy="1066800"/>
-          </a:xfrm>
-          <a:prstGeom prst="roundRect">
-            <a:avLst/>
-          </a:prstGeom>
-        </p:spPr>
-        <p:style>
-          <a:lnRef idx="1">
-            <a:schemeClr val="accent4"/>
-          </a:lnRef>
-          <a:fillRef idx="3">
-            <a:schemeClr val="accent4"/>
-          </a:fillRef>
-          <a:effectRef idx="2">
-            <a:schemeClr val="accent4"/>
-          </a:effectRef>
-          <a:fontRef idx="minor">
-            <a:schemeClr val="lt1"/>
-          </a:fontRef>
-        </p:style>
-        <p:txBody>
-          <a:bodyPr rtlCol="0" anchor="ctr"/>
-          <a:lstStyle/>
-          <a:p>
-            <a:pPr algn="ctr"/>
-            <a:r>
-              <a:rPr lang="en-US" sz="2200" dirty="0" smtClean="0">
-                <a:effectLst>
-                  <a:outerShdw blurRad="50800" dist="38100" dir="2700000" algn="tl" rotWithShape="0">
-                    <a:prstClr val="black">
-                      <a:alpha val="40000"/>
-                    </a:prstClr>
-                  </a:outerShdw>
-                </a:effectLst>
-                <a:latin typeface="小塚ゴシック Pro L" pitchFamily="34" charset="-128"/>
-                <a:ea typeface="小塚ゴシック Pro L" pitchFamily="34" charset="-128"/>
-              </a:rPr>
-              <a:t>Save Document</a:t>
-            </a:r>
-            <a:endParaRPr lang="en-US" sz="2200" dirty="0">
-              <a:effectLst>
-                <a:outerShdw blurRad="50800" dist="38100" dir="2700000" algn="tl" rotWithShape="0">
-                  <a:prstClr val="black">
-                    <a:alpha val="40000"/>
-                  </a:prstClr>
-                </a:outerShdw>
-              </a:effectLst>
-              <a:latin typeface="小塚ゴシック Pro L" pitchFamily="34" charset="-128"/>
-              <a:ea typeface="小塚ゴシック Pro L" pitchFamily="34" charset="-128"/>
-            </a:endParaRPr>
-          </a:p>
-        </p:txBody>
-      </p:sp>
-      <p:cxnSp>
-        <p:nvCxnSpPr>
-          <p:cNvPr id="11" name="Straight Connector 10"/>
-          <p:cNvCxnSpPr>
-            <a:stCxn id="5" idx="2"/>
-            <a:endCxn id="7" idx="3"/>
-          </p:cNvCxnSpPr>
-          <p:nvPr/>
-        </p:nvCxnSpPr>
-        <p:spPr>
-          <a:xfrm>
-            <a:off x="6354288" y="2616530"/>
-            <a:ext cx="8412" cy="764223"/>
-          </a:xfrm>
-          <a:prstGeom prst="line">
-            <a:avLst/>
-          </a:prstGeom>
-          <a:ln>
-            <a:prstDash val="dash"/>
-          </a:ln>
-        </p:spPr>
-        <p:style>
-          <a:lnRef idx="2">
-            <a:schemeClr val="dk1"/>
-          </a:lnRef>
-          <a:fillRef idx="0">
-            <a:schemeClr val="dk1"/>
-          </a:fillRef>
-          <a:effectRef idx="1">
-            <a:schemeClr val="dk1"/>
-          </a:effectRef>
-          <a:fontRef idx="minor">
-            <a:schemeClr val="tx1"/>
-          </a:fontRef>
-        </p:style>
-      </p:cxnSp>
-      <p:cxnSp>
-        <p:nvCxnSpPr>
-          <p:cNvPr id="12" name="Straight Connector 11"/>
-          <p:cNvCxnSpPr>
-            <a:stCxn id="7" idx="1"/>
-            <a:endCxn id="9" idx="0"/>
-          </p:cNvCxnSpPr>
-          <p:nvPr/>
-        </p:nvCxnSpPr>
-        <p:spPr>
-          <a:xfrm flipH="1">
-            <a:off x="6354288" y="4672470"/>
-            <a:ext cx="8412" cy="611060"/>
-          </a:xfrm>
-          <a:prstGeom prst="line">
-            <a:avLst/>
-          </a:prstGeom>
-        </p:spPr>
-        <p:style>
-          <a:lnRef idx="2">
-            <a:schemeClr val="dk1"/>
-          </a:lnRef>
-          <a:fillRef idx="0">
-            <a:schemeClr val="dk1"/>
-          </a:fillRef>
-          <a:effectRef idx="1">
-            <a:schemeClr val="dk1"/>
-          </a:effectRef>
-          <a:fontRef idx="minor">
-            <a:schemeClr val="tx1"/>
-          </a:fontRef>
-        </p:style>
-      </p:cxnSp>
-      <p:sp>
-        <p:nvSpPr>
-          <p:cNvPr id="35" name="TextBox 34"/>
-          <p:cNvSpPr txBox="1"/>
-          <p:nvPr/>
-        </p:nvSpPr>
-        <p:spPr>
-          <a:xfrm>
-            <a:off x="1442112" y="5896642"/>
-            <a:ext cx="1301087" cy="430887"/>
-          </a:xfrm>
-          <a:prstGeom prst="rect">
-            <a:avLst/>
-          </a:prstGeom>
-          <a:noFill/>
-        </p:spPr>
-        <p:txBody>
-          <a:bodyPr wrap="square" rtlCol="0">
-            <a:spAutoFit/>
-          </a:bodyPr>
-          <a:lstStyle/>
-          <a:p>
-            <a:pPr algn="ctr"/>
-            <a:r>
-              <a:rPr lang="en-US" sz="2200" dirty="0" err="1" smtClean="0">
-                <a:latin typeface="小塚ゴシック Pro L" pitchFamily="34" charset="-128"/>
-                <a:ea typeface="小塚ゴシック Pro L" pitchFamily="34" charset="-128"/>
-              </a:rPr>
-              <a:t>Alper</a:t>
-            </a:r>
-            <a:endParaRPr lang="en-US" sz="2200" dirty="0">
-              <a:latin typeface="小塚ゴシック Pro L" pitchFamily="34" charset="-128"/>
-              <a:ea typeface="小塚ゴシック Pro L" pitchFamily="34" charset="-128"/>
-            </a:endParaRPr>
-          </a:p>
-        </p:txBody>
-      </p:sp>
-      <p:grpSp>
-        <p:nvGrpSpPr>
-          <p:cNvPr id="63" name="Group 62"/>
-          <p:cNvGrpSpPr/>
-          <p:nvPr/>
-        </p:nvGrpSpPr>
-        <p:grpSpPr>
-          <a:xfrm>
-            <a:off x="1661134" y="4402897"/>
-            <a:ext cx="871351" cy="1417254"/>
-            <a:chOff x="1661134" y="4402897"/>
-            <a:chExt cx="871351" cy="1417254"/>
-          </a:xfrm>
-        </p:grpSpPr>
-        <p:sp>
-          <p:nvSpPr>
-            <p:cNvPr id="46" name="Cloud 45"/>
-            <p:cNvSpPr/>
-            <p:nvPr/>
-          </p:nvSpPr>
-          <p:spPr>
-            <a:xfrm rot="10638978">
-              <a:off x="1762749" y="4402897"/>
-              <a:ext cx="600559" cy="447658"/>
-            </a:xfrm>
-            <a:prstGeom prst="cloud">
-              <a:avLst/>
-            </a:prstGeom>
-            <a:solidFill>
-              <a:schemeClr val="tx1"/>
-            </a:solidFill>
-          </p:spPr>
-          <p:style>
-            <a:lnRef idx="1">
-              <a:schemeClr val="dk1"/>
-            </a:lnRef>
-            <a:fillRef idx="3">
-              <a:schemeClr val="dk1"/>
-            </a:fillRef>
-            <a:effectRef idx="2">
-              <a:schemeClr val="dk1"/>
-            </a:effectRef>
-            <a:fontRef idx="minor">
-              <a:schemeClr val="lt1"/>
-            </a:fontRef>
-          </p:style>
-          <p:txBody>
-            <a:bodyPr rtlCol="0" anchor="ctr"/>
-            <a:lstStyle/>
-            <a:p>
-              <a:pPr algn="ctr"/>
-              <a:endParaRPr lang="en-US" dirty="0"/>
-            </a:p>
-          </p:txBody>
-        </p:sp>
-        <p:sp>
-          <p:nvSpPr>
-            <p:cNvPr id="36" name="Oval 35"/>
-            <p:cNvSpPr/>
-            <p:nvPr/>
-          </p:nvSpPr>
-          <p:spPr>
-            <a:xfrm>
-              <a:off x="1888732" y="4495800"/>
-              <a:ext cx="407849" cy="416030"/>
-            </a:xfrm>
-            <a:prstGeom prst="ellipse">
-              <a:avLst/>
-            </a:prstGeom>
-          </p:spPr>
-          <p:style>
-            <a:lnRef idx="2">
-              <a:schemeClr val="dk1"/>
-            </a:lnRef>
-            <a:fillRef idx="1">
-              <a:schemeClr val="lt1"/>
-            </a:fillRef>
-            <a:effectRef idx="0">
-              <a:schemeClr val="dk1"/>
-            </a:effectRef>
-            <a:fontRef idx="minor">
-              <a:schemeClr val="dk1"/>
-            </a:fontRef>
-          </p:style>
-          <p:txBody>
-            <a:bodyPr rtlCol="0" anchor="ctr"/>
-            <a:lstStyle/>
-            <a:p>
-              <a:pPr algn="ctr"/>
-              <a:endParaRPr lang="en-US" sz="2200" dirty="0">
-                <a:latin typeface="小塚ゴシック Pro L" pitchFamily="34" charset="-128"/>
-                <a:ea typeface="小塚ゴシック Pro L" pitchFamily="34" charset="-128"/>
-              </a:endParaRPr>
-            </a:p>
-          </p:txBody>
-        </p:sp>
-        <p:cxnSp>
-          <p:nvCxnSpPr>
-            <p:cNvPr id="37" name="Straight Connector 36"/>
-            <p:cNvCxnSpPr>
-              <a:stCxn id="36" idx="4"/>
-            </p:cNvCxnSpPr>
-            <p:nvPr/>
-          </p:nvCxnSpPr>
-          <p:spPr>
-            <a:xfrm>
-              <a:off x="2092657" y="4911830"/>
-              <a:ext cx="4153" cy="501005"/>
-            </a:xfrm>
-            <a:prstGeom prst="line">
-              <a:avLst/>
-            </a:prstGeom>
-          </p:spPr>
-          <p:style>
-            <a:lnRef idx="2">
-              <a:schemeClr val="dk1"/>
-            </a:lnRef>
-            <a:fillRef idx="1">
-              <a:schemeClr val="lt1"/>
-            </a:fillRef>
-            <a:effectRef idx="0">
-              <a:schemeClr val="dk1"/>
-            </a:effectRef>
-            <a:fontRef idx="minor">
-              <a:schemeClr val="dk1"/>
-            </a:fontRef>
-          </p:style>
-        </p:cxnSp>
-        <p:cxnSp>
-          <p:nvCxnSpPr>
-            <p:cNvPr id="38" name="Straight Connector 37"/>
-            <p:cNvCxnSpPr/>
-            <p:nvPr/>
-          </p:nvCxnSpPr>
-          <p:spPr>
-            <a:xfrm>
-              <a:off x="1661134" y="5005519"/>
-              <a:ext cx="871351" cy="0"/>
-            </a:xfrm>
-            <a:prstGeom prst="line">
-              <a:avLst/>
-            </a:prstGeom>
-          </p:spPr>
-          <p:style>
-            <a:lnRef idx="2">
-              <a:schemeClr val="dk1"/>
-            </a:lnRef>
-            <a:fillRef idx="1">
-              <a:schemeClr val="lt1"/>
-            </a:fillRef>
-            <a:effectRef idx="0">
-              <a:schemeClr val="dk1"/>
-            </a:effectRef>
-            <a:fontRef idx="minor">
-              <a:schemeClr val="dk1"/>
-            </a:fontRef>
-          </p:style>
-        </p:cxnSp>
-        <p:cxnSp>
-          <p:nvCxnSpPr>
-            <p:cNvPr id="39" name="Straight Connector 38"/>
-            <p:cNvCxnSpPr/>
-            <p:nvPr/>
-          </p:nvCxnSpPr>
-          <p:spPr>
-            <a:xfrm>
-              <a:off x="2096810" y="5412835"/>
-              <a:ext cx="215969" cy="407316"/>
-            </a:xfrm>
-            <a:prstGeom prst="line">
-              <a:avLst/>
-            </a:prstGeom>
-          </p:spPr>
-          <p:style>
-            <a:lnRef idx="2">
-              <a:schemeClr val="dk1"/>
-            </a:lnRef>
-            <a:fillRef idx="1">
-              <a:schemeClr val="lt1"/>
-            </a:fillRef>
-            <a:effectRef idx="0">
-              <a:schemeClr val="dk1"/>
-            </a:effectRef>
-            <a:fontRef idx="minor">
-              <a:schemeClr val="dk1"/>
-            </a:fontRef>
-          </p:style>
-        </p:cxnSp>
-        <p:cxnSp>
-          <p:nvCxnSpPr>
-            <p:cNvPr id="40" name="Straight Connector 39"/>
-            <p:cNvCxnSpPr/>
-            <p:nvPr/>
-          </p:nvCxnSpPr>
-          <p:spPr>
-            <a:xfrm flipH="1">
-              <a:off x="1801099" y="5412835"/>
-              <a:ext cx="295711" cy="407316"/>
-            </a:xfrm>
-            <a:prstGeom prst="line">
-              <a:avLst/>
-            </a:prstGeom>
-          </p:spPr>
-          <p:style>
-            <a:lnRef idx="2">
-              <a:schemeClr val="dk1"/>
-            </a:lnRef>
-            <a:fillRef idx="1">
-              <a:schemeClr val="lt1"/>
-            </a:fillRef>
-            <a:effectRef idx="0">
-              <a:schemeClr val="dk1"/>
-            </a:effectRef>
-            <a:fontRef idx="minor">
-              <a:schemeClr val="dk1"/>
-            </a:fontRef>
-          </p:style>
-        </p:cxnSp>
-        <p:sp>
-          <p:nvSpPr>
-            <p:cNvPr id="28" name="Cloud 27"/>
-            <p:cNvSpPr/>
-            <p:nvPr/>
-          </p:nvSpPr>
-          <p:spPr>
-            <a:xfrm>
-              <a:off x="1902298" y="4735112"/>
-              <a:ext cx="389025" cy="228600"/>
-            </a:xfrm>
-            <a:prstGeom prst="cloud">
-              <a:avLst/>
-            </a:prstGeom>
-            <a:solidFill>
-              <a:schemeClr val="tx1"/>
-            </a:solidFill>
-          </p:spPr>
-          <p:style>
-            <a:lnRef idx="1">
-              <a:schemeClr val="dk1"/>
-            </a:lnRef>
-            <a:fillRef idx="3">
-              <a:schemeClr val="dk1"/>
-            </a:fillRef>
-            <a:effectRef idx="2">
-              <a:schemeClr val="dk1"/>
-            </a:effectRef>
-            <a:fontRef idx="minor">
-              <a:schemeClr val="lt1"/>
-            </a:fontRef>
-          </p:style>
-          <p:txBody>
-            <a:bodyPr rtlCol="0" anchor="ctr"/>
-            <a:lstStyle/>
-            <a:p>
-              <a:pPr algn="ctr"/>
-              <a:endParaRPr lang="en-US" dirty="0"/>
-            </a:p>
-          </p:txBody>
-        </p:sp>
-        <p:sp>
-          <p:nvSpPr>
-            <p:cNvPr id="48" name="Cloud 47"/>
-            <p:cNvSpPr/>
-            <p:nvPr/>
-          </p:nvSpPr>
-          <p:spPr>
-            <a:xfrm rot="11893449">
-              <a:off x="1908054" y="4584396"/>
-              <a:ext cx="166879" cy="63573"/>
-            </a:xfrm>
-            <a:prstGeom prst="cloud">
-              <a:avLst/>
-            </a:prstGeom>
-            <a:solidFill>
-              <a:schemeClr val="tx1"/>
-            </a:solidFill>
-          </p:spPr>
-          <p:style>
-            <a:lnRef idx="1">
-              <a:schemeClr val="dk1"/>
-            </a:lnRef>
-            <a:fillRef idx="3">
-              <a:schemeClr val="dk1"/>
-            </a:fillRef>
-            <a:effectRef idx="2">
-              <a:schemeClr val="dk1"/>
-            </a:effectRef>
-            <a:fontRef idx="minor">
-              <a:schemeClr val="lt1"/>
-            </a:fontRef>
-          </p:style>
-          <p:txBody>
-            <a:bodyPr rtlCol="0" anchor="ctr"/>
-            <a:lstStyle/>
-            <a:p>
-              <a:pPr algn="ctr"/>
-              <a:endParaRPr lang="en-US" dirty="0"/>
-            </a:p>
-          </p:txBody>
-        </p:sp>
-        <p:sp>
-          <p:nvSpPr>
-            <p:cNvPr id="49" name="Cloud 48"/>
-            <p:cNvSpPr/>
-            <p:nvPr/>
-          </p:nvSpPr>
-          <p:spPr>
-            <a:xfrm rot="9762561">
-              <a:off x="2098332" y="4580952"/>
-              <a:ext cx="166879" cy="63573"/>
-            </a:xfrm>
-            <a:prstGeom prst="cloud">
-              <a:avLst/>
-            </a:prstGeom>
-            <a:solidFill>
-              <a:schemeClr val="tx1"/>
-            </a:solidFill>
-          </p:spPr>
-          <p:style>
-            <a:lnRef idx="1">
-              <a:schemeClr val="dk1"/>
-            </a:lnRef>
-            <a:fillRef idx="3">
-              <a:schemeClr val="dk1"/>
-            </a:fillRef>
-            <a:effectRef idx="2">
-              <a:schemeClr val="dk1"/>
-            </a:effectRef>
-            <a:fontRef idx="minor">
-              <a:schemeClr val="lt1"/>
-            </a:fontRef>
-          </p:style>
-          <p:txBody>
-            <a:bodyPr rtlCol="0" anchor="ctr"/>
-            <a:lstStyle/>
-            <a:p>
-              <a:pPr algn="ctr"/>
-              <a:endParaRPr lang="en-US" dirty="0"/>
-            </a:p>
-          </p:txBody>
-        </p:sp>
-        <p:sp>
-          <p:nvSpPr>
-            <p:cNvPr id="47" name="Arc 46"/>
-            <p:cNvSpPr/>
-            <p:nvPr/>
-          </p:nvSpPr>
-          <p:spPr>
-            <a:xfrm rot="19177275">
-              <a:off x="1909124" y="4830010"/>
-              <a:ext cx="375372" cy="277412"/>
-            </a:xfrm>
-            <a:prstGeom prst="arc">
-              <a:avLst>
-                <a:gd name="adj1" fmla="val 17081623"/>
-                <a:gd name="adj2" fmla="val 20622423"/>
-              </a:avLst>
-            </a:prstGeom>
-            <a:noFill/>
-            <a:ln>
-              <a:solidFill>
-                <a:schemeClr val="bg1"/>
-              </a:solidFill>
-            </a:ln>
-          </p:spPr>
-          <p:style>
-            <a:lnRef idx="2">
-              <a:schemeClr val="accent1"/>
-            </a:lnRef>
-            <a:fillRef idx="0">
-              <a:schemeClr val="accent1"/>
-            </a:fillRef>
-            <a:effectRef idx="1">
-              <a:schemeClr val="accent1"/>
-            </a:effectRef>
-            <a:fontRef idx="minor">
-              <a:schemeClr val="tx1"/>
-            </a:fontRef>
-          </p:style>
-          <p:txBody>
-            <a:bodyPr rtlCol="0" anchor="ctr"/>
-            <a:lstStyle/>
-            <a:p>
-              <a:pPr algn="ctr"/>
-              <a:endParaRPr lang="en-US"/>
-            </a:p>
-          </p:txBody>
-        </p:sp>
-      </p:grpSp>
-      <p:grpSp>
-        <p:nvGrpSpPr>
-          <p:cNvPr id="41" name="Group 40"/>
-          <p:cNvGrpSpPr/>
-          <p:nvPr/>
-        </p:nvGrpSpPr>
-        <p:grpSpPr>
-          <a:xfrm>
-            <a:off x="2743200" y="1808470"/>
-            <a:ext cx="1752600" cy="1801499"/>
-            <a:chOff x="2687745" y="2998641"/>
-            <a:chExt cx="1752600" cy="1801499"/>
-          </a:xfrm>
-        </p:grpSpPr>
-        <p:sp>
-          <p:nvSpPr>
-            <p:cNvPr id="42" name="Cloud 41"/>
-            <p:cNvSpPr/>
-            <p:nvPr/>
-          </p:nvSpPr>
-          <p:spPr>
-            <a:xfrm>
-              <a:off x="2687745" y="2998641"/>
-              <a:ext cx="1752600" cy="1062145"/>
-            </a:xfrm>
-            <a:prstGeom prst="cloud">
-              <a:avLst/>
-            </a:prstGeom>
-          </p:spPr>
-          <p:style>
-            <a:lnRef idx="1">
-              <a:schemeClr val="dk1"/>
-            </a:lnRef>
-            <a:fillRef idx="3">
-              <a:schemeClr val="dk1"/>
-            </a:fillRef>
-            <a:effectRef idx="2">
-              <a:schemeClr val="dk1"/>
-            </a:effectRef>
-            <a:fontRef idx="minor">
-              <a:schemeClr val="lt1"/>
-            </a:fontRef>
-          </p:style>
-          <p:txBody>
-            <a:bodyPr rtlCol="0" anchor="ctr"/>
-            <a:lstStyle/>
-            <a:p>
-              <a:pPr algn="ctr"/>
-              <a:endParaRPr lang="en-US"/>
-            </a:p>
-          </p:txBody>
-        </p:sp>
-        <p:grpSp>
-          <p:nvGrpSpPr>
-            <p:cNvPr id="43" name="Group 42"/>
-            <p:cNvGrpSpPr/>
-            <p:nvPr/>
-          </p:nvGrpSpPr>
-          <p:grpSpPr>
-            <a:xfrm>
-              <a:off x="2819400" y="3272135"/>
-              <a:ext cx="1489291" cy="1528005"/>
-              <a:chOff x="2549308" y="3530612"/>
-              <a:chExt cx="1489291" cy="1528005"/>
-            </a:xfrm>
-          </p:grpSpPr>
-          <p:sp>
-            <p:nvSpPr>
-              <p:cNvPr id="44" name="Lightning Bolt 43"/>
-              <p:cNvSpPr/>
-              <p:nvPr/>
-            </p:nvSpPr>
-            <p:spPr>
-              <a:xfrm>
-                <a:off x="2971799" y="3908392"/>
-                <a:ext cx="644308" cy="1150225"/>
-              </a:xfrm>
-              <a:prstGeom prst="lightningBolt">
-                <a:avLst/>
-              </a:prstGeom>
-              <a:solidFill>
-                <a:srgbClr val="FFFF00"/>
-              </a:solidFill>
-            </p:spPr>
-            <p:style>
-              <a:lnRef idx="1">
-                <a:schemeClr val="accent1"/>
-              </a:lnRef>
-              <a:fillRef idx="3">
-                <a:schemeClr val="accent1"/>
-              </a:fillRef>
-              <a:effectRef idx="2">
-                <a:schemeClr val="accent1"/>
-              </a:effectRef>
-              <a:fontRef idx="minor">
-                <a:schemeClr val="lt1"/>
-              </a:fontRef>
-            </p:style>
-            <p:txBody>
-              <a:bodyPr rtlCol="0" anchor="ctr"/>
-              <a:lstStyle/>
-              <a:p>
-                <a:pPr algn="ctr"/>
-                <a:endParaRPr lang="en-US" dirty="0"/>
-              </a:p>
-            </p:txBody>
-          </p:sp>
-          <p:sp>
-            <p:nvSpPr>
-              <p:cNvPr id="45" name="TextBox 44"/>
-              <p:cNvSpPr txBox="1"/>
-              <p:nvPr/>
-            </p:nvSpPr>
-            <p:spPr>
-              <a:xfrm>
-                <a:off x="2549308" y="3530612"/>
-                <a:ext cx="1489291" cy="461665"/>
-              </a:xfrm>
-              <a:prstGeom prst="rect">
-                <a:avLst/>
-              </a:prstGeom>
-              <a:noFill/>
-              <a:effectLst/>
-            </p:spPr>
-            <p:txBody>
-              <a:bodyPr wrap="square" rtlCol="0">
-                <a:spAutoFit/>
-              </a:bodyPr>
-              <a:lstStyle/>
-              <a:p>
-                <a:r>
-                  <a:rPr lang="en-US" sz="2400" dirty="0" smtClean="0">
-                    <a:solidFill>
-                      <a:schemeClr val="bg1"/>
-                    </a:solidFill>
-                    <a:effectLst>
-                      <a:outerShdw blurRad="50800" dist="38100" dir="2700000" algn="tl" rotWithShape="0">
-                        <a:prstClr val="black">
-                          <a:alpha val="40000"/>
-                        </a:prstClr>
-                      </a:outerShdw>
-                    </a:effectLst>
-                    <a:latin typeface="小塚ゴシック Pro M" pitchFamily="34" charset="-128"/>
-                    <a:ea typeface="小塚ゴシック Pro M" pitchFamily="34" charset="-128"/>
-                  </a:rPr>
-                  <a:t>UPDATE!</a:t>
-                </a:r>
-                <a:endParaRPr lang="en-US" sz="2400" dirty="0">
-                  <a:solidFill>
-                    <a:schemeClr val="bg1"/>
-                  </a:solidFill>
-                  <a:effectLst>
-                    <a:outerShdw blurRad="50800" dist="38100" dir="2700000" algn="tl" rotWithShape="0">
-                      <a:prstClr val="black">
-                        <a:alpha val="40000"/>
-                      </a:prstClr>
-                    </a:outerShdw>
-                  </a:effectLst>
-                  <a:latin typeface="小塚ゴシック Pro M" pitchFamily="34" charset="-128"/>
-                  <a:ea typeface="小塚ゴシック Pro M" pitchFamily="34" charset="-128"/>
-                </a:endParaRPr>
-              </a:p>
-            </p:txBody>
-          </p:sp>
-        </p:grpSp>
       </p:grpSp>
       <p:grpSp>
         <p:nvGrpSpPr>
@@ -5342,6 +3460,110 @@
           </p:txBody>
         </p:sp>
       </p:grpSp>
+      <p:grpSp>
+        <p:nvGrpSpPr>
+          <p:cNvPr id="64" name="Group 63"/>
+          <p:cNvGrpSpPr/>
+          <p:nvPr/>
+        </p:nvGrpSpPr>
+        <p:grpSpPr>
+          <a:xfrm>
+            <a:off x="2363934" y="1895312"/>
+            <a:ext cx="1475318" cy="1030369"/>
+            <a:chOff x="2438400" y="2515434"/>
+            <a:chExt cx="1475318" cy="1030369"/>
+          </a:xfrm>
+        </p:grpSpPr>
+        <p:sp>
+          <p:nvSpPr>
+            <p:cNvPr id="65" name="Explosion 1 64"/>
+            <p:cNvSpPr/>
+            <p:nvPr/>
+          </p:nvSpPr>
+          <p:spPr>
+            <a:xfrm>
+              <a:off x="2438400" y="2515434"/>
+              <a:ext cx="1475318" cy="1030369"/>
+            </a:xfrm>
+            <a:prstGeom prst="irregularSeal1">
+              <a:avLst/>
+            </a:prstGeom>
+            <a:solidFill>
+              <a:schemeClr val="bg1"/>
+            </a:solidFill>
+            <a:ln>
+              <a:solidFill>
+                <a:schemeClr val="tx1"/>
+              </a:solidFill>
+            </a:ln>
+          </p:spPr>
+          <p:style>
+            <a:lnRef idx="1">
+              <a:schemeClr val="accent1"/>
+            </a:lnRef>
+            <a:fillRef idx="3">
+              <a:schemeClr val="accent1"/>
+            </a:fillRef>
+            <a:effectRef idx="2">
+              <a:schemeClr val="accent1"/>
+            </a:effectRef>
+            <a:fontRef idx="minor">
+              <a:schemeClr val="lt1"/>
+            </a:fontRef>
+          </p:style>
+          <p:txBody>
+            <a:bodyPr rtlCol="0" anchor="ctr"/>
+            <a:lstStyle/>
+            <a:p>
+              <a:pPr algn="ctr"/>
+              <a:endParaRPr lang="en-US" dirty="0">
+                <a:solidFill>
+                  <a:schemeClr val="tx1"/>
+                </a:solidFill>
+                <a:latin typeface="小塚ゴシック Pro M" pitchFamily="34" charset="-128"/>
+                <a:ea typeface="小塚ゴシック Pro M" pitchFamily="34" charset="-128"/>
+              </a:endParaRPr>
+            </a:p>
+          </p:txBody>
+        </p:sp>
+        <p:sp>
+          <p:nvSpPr>
+            <p:cNvPr id="66" name="TextBox 65"/>
+            <p:cNvSpPr txBox="1"/>
+            <p:nvPr/>
+          </p:nvSpPr>
+          <p:spPr>
+            <a:xfrm>
+              <a:off x="2590800" y="2845952"/>
+              <a:ext cx="1170518" cy="369332"/>
+            </a:xfrm>
+            <a:prstGeom prst="rect">
+              <a:avLst/>
+            </a:prstGeom>
+            <a:noFill/>
+          </p:spPr>
+          <p:txBody>
+            <a:bodyPr wrap="square" rtlCol="0">
+              <a:spAutoFit/>
+            </a:bodyPr>
+            <a:lstStyle/>
+            <a:p>
+              <a:pPr algn="ctr"/>
+              <a:r>
+                <a:rPr lang="en-US" dirty="0" smtClean="0">
+                  <a:latin typeface="小塚ゴシック Pro M" pitchFamily="34" charset="-128"/>
+                  <a:ea typeface="小塚ゴシック Pro M" pitchFamily="34" charset="-128"/>
+                </a:rPr>
+                <a:t>UPDATE</a:t>
+              </a:r>
+              <a:endParaRPr lang="en-US" dirty="0">
+                <a:latin typeface="小塚ゴシック Pro M" pitchFamily="34" charset="-128"/>
+                <a:ea typeface="小塚ゴシック Pro M" pitchFamily="34" charset="-128"/>
+              </a:endParaRPr>
+            </a:p>
+          </p:txBody>
+        </p:sp>
+      </p:grpSp>
     </p:spTree>
     <p:extLst>
       <p:ext uri="{BB962C8B-B14F-4D97-AF65-F5344CB8AC3E}">
@@ -5362,7 +3584,7 @@
 </p:sld>
 </file>
 
-<file path=ppt/slides/slide12.xml><?xml version="1.0" encoding="utf-8"?>
+<file path=ppt/slides/slide11.xml><?xml version="1.0" encoding="utf-8"?>
 <p:sld xmlns:a="http://schemas.openxmlformats.org/drawingml/2006/main" xmlns:r="http://schemas.openxmlformats.org/officeDocument/2006/relationships" xmlns:p="http://schemas.openxmlformats.org/presentationml/2006/main">
   <p:cSld>
     <p:spTree>
@@ -5379,6 +3601,52 @@
           <a:chExt cx="0" cy="0"/>
         </a:xfrm>
       </p:grpSpPr>
+      <p:sp>
+        <p:nvSpPr>
+          <p:cNvPr id="61" name="Rectangle 60"/>
+          <p:cNvSpPr/>
+          <p:nvPr/>
+        </p:nvSpPr>
+        <p:spPr>
+          <a:xfrm>
+            <a:off x="533400" y="3988130"/>
+            <a:ext cx="8153400" cy="2641270"/>
+          </a:xfrm>
+          <a:prstGeom prst="rect">
+            <a:avLst/>
+          </a:prstGeom>
+          <a:solidFill>
+            <a:srgbClr val="00FF00">
+              <a:alpha val="23922"/>
+            </a:srgbClr>
+          </a:solidFill>
+          <a:ln>
+            <a:noFill/>
+          </a:ln>
+        </p:spPr>
+        <p:style>
+          <a:lnRef idx="1">
+            <a:schemeClr val="accent3"/>
+          </a:lnRef>
+          <a:fillRef idx="3">
+            <a:schemeClr val="accent3"/>
+          </a:fillRef>
+          <a:effectRef idx="2">
+            <a:schemeClr val="accent3"/>
+          </a:effectRef>
+          <a:fontRef idx="minor">
+            <a:schemeClr val="lt1"/>
+          </a:fontRef>
+        </p:style>
+        <p:txBody>
+          <a:bodyPr rtlCol="0" anchor="ctr"/>
+          <a:lstStyle/>
+          <a:p>
+            <a:pPr algn="ctr"/>
+            <a:endParaRPr lang="en-US"/>
+          </a:p>
+        </p:txBody>
+      </p:sp>
       <p:sp>
         <p:nvSpPr>
           <p:cNvPr id="7" name="Cloud 6"/>
@@ -5424,52 +3692,6 @@
               <a:latin typeface="小塚ゴシック Pro L" pitchFamily="34" charset="-128"/>
               <a:ea typeface="小塚ゴシック Pro L" pitchFamily="34" charset="-128"/>
             </a:endParaRPr>
-          </a:p>
-        </p:txBody>
-      </p:sp>
-      <p:sp>
-        <p:nvSpPr>
-          <p:cNvPr id="61" name="Rectangle 60"/>
-          <p:cNvSpPr/>
-          <p:nvPr/>
-        </p:nvSpPr>
-        <p:spPr>
-          <a:xfrm>
-            <a:off x="533400" y="3988130"/>
-            <a:ext cx="8153400" cy="2641270"/>
-          </a:xfrm>
-          <a:prstGeom prst="rect">
-            <a:avLst/>
-          </a:prstGeom>
-          <a:solidFill>
-            <a:srgbClr val="00FF00">
-              <a:alpha val="23922"/>
-            </a:srgbClr>
-          </a:solidFill>
-          <a:ln>
-            <a:noFill/>
-          </a:ln>
-        </p:spPr>
-        <p:style>
-          <a:lnRef idx="1">
-            <a:schemeClr val="accent3"/>
-          </a:lnRef>
-          <a:fillRef idx="3">
-            <a:schemeClr val="accent3"/>
-          </a:fillRef>
-          <a:effectRef idx="2">
-            <a:schemeClr val="accent3"/>
-          </a:effectRef>
-          <a:fontRef idx="minor">
-            <a:schemeClr val="lt1"/>
-          </a:fontRef>
-        </p:style>
-        <p:txBody>
-          <a:bodyPr rtlCol="0" anchor="ctr"/>
-          <a:lstStyle/>
-          <a:p>
-            <a:pPr algn="ctr"/>
-            <a:endParaRPr lang="en-US"/>
           </a:p>
         </p:txBody>
       </p:sp>
@@ -6129,68 +4351,6 @@
           </p:txBody>
         </p:sp>
       </p:grpSp>
-      <p:sp>
-        <p:nvSpPr>
-          <p:cNvPr id="3" name="Cloud 2"/>
-          <p:cNvSpPr/>
-          <p:nvPr/>
-        </p:nvSpPr>
-        <p:spPr>
-          <a:xfrm>
-            <a:off x="2373459" y="1417638"/>
-            <a:ext cx="1125114" cy="818932"/>
-          </a:xfrm>
-          <a:prstGeom prst="cloud">
-            <a:avLst/>
-          </a:prstGeom>
-          <a:solidFill>
-            <a:schemeClr val="bg1"/>
-          </a:solidFill>
-          <a:ln>
-            <a:solidFill>
-              <a:schemeClr val="tx1"/>
-            </a:solidFill>
-          </a:ln>
-        </p:spPr>
-        <p:style>
-          <a:lnRef idx="1">
-            <a:schemeClr val="accent1"/>
-          </a:lnRef>
-          <a:fillRef idx="3">
-            <a:schemeClr val="accent1"/>
-          </a:fillRef>
-          <a:effectRef idx="2">
-            <a:schemeClr val="accent1"/>
-          </a:effectRef>
-          <a:fontRef idx="minor">
-            <a:schemeClr val="lt1"/>
-          </a:fontRef>
-        </p:style>
-        <p:txBody>
-          <a:bodyPr rtlCol="0" anchor="ctr"/>
-          <a:lstStyle/>
-          <a:p>
-            <a:pPr algn="ctr"/>
-            <a:r>
-              <a:rPr lang="en-US" sz="2400" b="1" dirty="0" smtClean="0">
-                <a:solidFill>
-                  <a:schemeClr val="tx1"/>
-                </a:solidFill>
-                <a:latin typeface="小塚ゴシック Pro L" pitchFamily="34" charset="-128"/>
-                <a:ea typeface="小塚ゴシック Pro L" pitchFamily="34" charset="-128"/>
-              </a:rPr>
-              <a:t>???</a:t>
-            </a:r>
-            <a:endParaRPr lang="en-US" sz="2400" b="1" dirty="0">
-              <a:solidFill>
-                <a:schemeClr val="tx1"/>
-              </a:solidFill>
-              <a:latin typeface="小塚ゴシック Pro L" pitchFamily="34" charset="-128"/>
-              <a:ea typeface="小塚ゴシック Pro L" pitchFamily="34" charset="-128"/>
-            </a:endParaRPr>
-          </a:p>
-        </p:txBody>
-      </p:sp>
       <p:grpSp>
         <p:nvGrpSpPr>
           <p:cNvPr id="50" name="Group 49"/>
@@ -6942,6 +5102,159 @@
           </p:txBody>
         </p:sp>
       </p:grpSp>
+      <p:grpSp>
+        <p:nvGrpSpPr>
+          <p:cNvPr id="43" name="Group 42"/>
+          <p:cNvGrpSpPr/>
+          <p:nvPr/>
+        </p:nvGrpSpPr>
+        <p:grpSpPr>
+          <a:xfrm>
+            <a:off x="4648200" y="1219200"/>
+            <a:ext cx="1447800" cy="1192827"/>
+            <a:chOff x="2331830" y="2616530"/>
+            <a:chExt cx="1447800" cy="1192827"/>
+          </a:xfrm>
+        </p:grpSpPr>
+        <p:sp>
+          <p:nvSpPr>
+            <p:cNvPr id="44" name="Explosion 1 43"/>
+            <p:cNvSpPr/>
+            <p:nvPr/>
+          </p:nvSpPr>
+          <p:spPr>
+            <a:xfrm>
+              <a:off x="2331830" y="2616530"/>
+              <a:ext cx="1447800" cy="1192827"/>
+            </a:xfrm>
+            <a:prstGeom prst="irregularSeal1">
+              <a:avLst/>
+            </a:prstGeom>
+          </p:spPr>
+          <p:style>
+            <a:lnRef idx="1">
+              <a:schemeClr val="accent6"/>
+            </a:lnRef>
+            <a:fillRef idx="3">
+              <a:schemeClr val="accent6"/>
+            </a:fillRef>
+            <a:effectRef idx="2">
+              <a:schemeClr val="accent6"/>
+            </a:effectRef>
+            <a:fontRef idx="minor">
+              <a:schemeClr val="lt1"/>
+            </a:fontRef>
+          </p:style>
+          <p:txBody>
+            <a:bodyPr rtlCol="0" anchor="ctr"/>
+            <a:lstStyle/>
+            <a:p>
+              <a:pPr algn="ctr"/>
+              <a:endParaRPr lang="en-US"/>
+            </a:p>
+          </p:txBody>
+        </p:sp>
+        <p:sp>
+          <p:nvSpPr>
+            <p:cNvPr id="45" name="Explosion 1 44"/>
+            <p:cNvSpPr/>
+            <p:nvPr/>
+          </p:nvSpPr>
+          <p:spPr>
+            <a:xfrm>
+              <a:off x="2667000" y="2902831"/>
+              <a:ext cx="746952" cy="620224"/>
+            </a:xfrm>
+            <a:prstGeom prst="irregularSeal1">
+              <a:avLst/>
+            </a:prstGeom>
+          </p:spPr>
+          <p:style>
+            <a:lnRef idx="1">
+              <a:schemeClr val="accent2"/>
+            </a:lnRef>
+            <a:fillRef idx="3">
+              <a:schemeClr val="accent2"/>
+            </a:fillRef>
+            <a:effectRef idx="2">
+              <a:schemeClr val="accent2"/>
+            </a:effectRef>
+            <a:fontRef idx="minor">
+              <a:schemeClr val="lt1"/>
+            </a:fontRef>
+          </p:style>
+          <p:txBody>
+            <a:bodyPr rtlCol="0" anchor="ctr"/>
+            <a:lstStyle/>
+            <a:p>
+              <a:pPr algn="ctr"/>
+              <a:endParaRPr lang="en-US"/>
+            </a:p>
+          </p:txBody>
+        </p:sp>
+      </p:grpSp>
+      <p:sp>
+        <p:nvSpPr>
+          <p:cNvPr id="4" name="Cloud Callout 3"/>
+          <p:cNvSpPr/>
+          <p:nvPr/>
+        </p:nvSpPr>
+        <p:spPr>
+          <a:xfrm>
+            <a:off x="2181771" y="1219200"/>
+            <a:ext cx="1295400" cy="660622"/>
+          </a:xfrm>
+          <a:prstGeom prst="cloudCallout">
+            <a:avLst/>
+          </a:prstGeom>
+          <a:solidFill>
+            <a:schemeClr val="bg1"/>
+          </a:solidFill>
+          <a:ln>
+            <a:solidFill>
+              <a:schemeClr val="tx1"/>
+            </a:solidFill>
+          </a:ln>
+        </p:spPr>
+        <p:style>
+          <a:lnRef idx="1">
+            <a:schemeClr val="accent1"/>
+          </a:lnRef>
+          <a:fillRef idx="3">
+            <a:schemeClr val="accent1"/>
+          </a:fillRef>
+          <a:effectRef idx="2">
+            <a:schemeClr val="accent1"/>
+          </a:effectRef>
+          <a:fontRef idx="minor">
+            <a:schemeClr val="lt1"/>
+          </a:fontRef>
+        </p:style>
+        <p:txBody>
+          <a:bodyPr rtlCol="0" anchor="t"/>
+          <a:lstStyle/>
+          <a:p>
+            <a:pPr algn="ctr"/>
+            <a:r>
+              <a:rPr lang="en-US" sz="2400" dirty="0" smtClean="0">
+                <a:solidFill>
+                  <a:schemeClr val="tx1"/>
+                </a:solidFill>
+                <a:latin typeface="小塚ゴシック Pro M" pitchFamily="34" charset="-128"/>
+                <a:ea typeface="小塚ゴシック Pro M" pitchFamily="34" charset="-128"/>
+              </a:rPr>
+              <a:t>???</a:t>
+            </a:r>
+            <a:endParaRPr lang="en-US" sz="2400" dirty="0">
+              <a:solidFill>
+                <a:schemeClr val="tx1"/>
+              </a:solidFill>
+              <a:latin typeface="小塚ゴシック Pro M" pitchFamily="34" charset="-128"/>
+              <a:ea typeface="小塚ゴシック Pro M" pitchFamily="34" charset="-128"/>
+            </a:endParaRPr>
+          </a:p>
+        </p:txBody>
+      </p:sp>
     </p:spTree>
     <p:extLst>
       <p:ext uri="{BB962C8B-B14F-4D97-AF65-F5344CB8AC3E}">
@@ -6962,7 +5275,7 @@
 </p:sld>
 </file>
 
-<file path=ppt/slides/slide13.xml><?xml version="1.0" encoding="utf-8"?>
+<file path=ppt/slides/slide12.xml><?xml version="1.0" encoding="utf-8"?>
 <p:sld xmlns:a="http://schemas.openxmlformats.org/drawingml/2006/main" xmlns:r="http://schemas.openxmlformats.org/officeDocument/2006/relationships" xmlns:p="http://schemas.openxmlformats.org/presentationml/2006/main">
   <p:cSld>
     <p:spTree>
@@ -8395,13 +6708,13 @@
             </p:sp>
             <p:sp>
               <p:nvSpPr>
-                <p:cNvPr id="22" name="Arc 21"/>
+                <p:cNvPr id="41" name="Arc 40"/>
                 <p:cNvSpPr/>
                 <p:nvPr/>
               </p:nvSpPr>
               <p:spPr>
-                <a:xfrm rot="19177275">
-                  <a:off x="1909124" y="4830010"/>
+                <a:xfrm rot="8771129">
+                  <a:off x="1960147" y="4522832"/>
                   <a:ext cx="375372" cy="277412"/>
                 </a:xfrm>
                 <a:prstGeom prst="arc">
@@ -8675,7 +6988,7 @@
 </p:sld>
 </file>
 
-<file path=ppt/slides/slide14.xml><?xml version="1.0" encoding="utf-8"?>
+<file path=ppt/slides/slide13.xml><?xml version="1.0" encoding="utf-8"?>
 <p:sld xmlns:a="http://schemas.openxmlformats.org/drawingml/2006/main" xmlns:r="http://schemas.openxmlformats.org/officeDocument/2006/relationships" xmlns:p="http://schemas.openxmlformats.org/presentationml/2006/main">
   <p:cSld>
     <p:spTree>
@@ -9043,7 +7356,7 @@
 </p:sld>
 </file>
 
-<file path=ppt/slides/slide15.xml><?xml version="1.0" encoding="utf-8"?>
+<file path=ppt/slides/slide14.xml><?xml version="1.0" encoding="utf-8"?>
 <p:sld xmlns:a="http://schemas.openxmlformats.org/drawingml/2006/main" xmlns:r="http://schemas.openxmlformats.org/officeDocument/2006/relationships" xmlns:p="http://schemas.openxmlformats.org/presentationml/2006/main">
   <p:cSld>
     <p:spTree>
@@ -9412,7 +7725,7 @@
 </p:sld>
 </file>
 
-<file path=ppt/slides/slide16.xml><?xml version="1.0" encoding="utf-8"?>
+<file path=ppt/slides/slide15.xml><?xml version="1.0" encoding="utf-8"?>
 <p:sld xmlns:a="http://schemas.openxmlformats.org/drawingml/2006/main" xmlns:r="http://schemas.openxmlformats.org/officeDocument/2006/relationships" xmlns:p="http://schemas.openxmlformats.org/presentationml/2006/main">
   <p:cSld>
     <p:spTree>
@@ -10269,7 +8582,7 @@
 </p:sld>
 </file>
 
-<file path=ppt/slides/slide17.xml><?xml version="1.0" encoding="utf-8"?>
+<file path=ppt/slides/slide16.xml><?xml version="1.0" encoding="utf-8"?>
 <p:sld xmlns:a="http://schemas.openxmlformats.org/drawingml/2006/main" xmlns:r="http://schemas.openxmlformats.org/officeDocument/2006/relationships" xmlns:p="http://schemas.openxmlformats.org/presentationml/2006/main">
   <p:cSld>
     <p:spTree>
@@ -10699,7 +9012,7 @@
 </p:sld>
 </file>
 
-<file path=ppt/slides/slide18.xml><?xml version="1.0" encoding="utf-8"?>
+<file path=ppt/slides/slide17.xml><?xml version="1.0" encoding="utf-8"?>
 <p:sld xmlns:a="http://schemas.openxmlformats.org/drawingml/2006/main" xmlns:r="http://schemas.openxmlformats.org/officeDocument/2006/relationships" xmlns:p="http://schemas.openxmlformats.org/presentationml/2006/main">
   <p:cSld>
     <p:spTree>
@@ -11295,7 +9608,7 @@
 </p:sld>
 </file>
 
-<file path=ppt/slides/slide19.xml><?xml version="1.0" encoding="utf-8"?>
+<file path=ppt/slides/slide18.xml><?xml version="1.0" encoding="utf-8"?>
 <p:sld xmlns:a="http://schemas.openxmlformats.org/drawingml/2006/main" xmlns:r="http://schemas.openxmlformats.org/officeDocument/2006/relationships" xmlns:p="http://schemas.openxmlformats.org/presentationml/2006/main">
   <p:cSld>
     <p:spTree>
@@ -12231,149 +10544,7 @@
 </p:sld>
 </file>
 
-<file path=ppt/slides/slide2.xml><?xml version="1.0" encoding="utf-8"?>
-<p:sld xmlns:a="http://schemas.openxmlformats.org/drawingml/2006/main" xmlns:r="http://schemas.openxmlformats.org/officeDocument/2006/relationships" xmlns:p="http://schemas.openxmlformats.org/presentationml/2006/main">
-  <p:cSld>
-    <p:spTree>
-      <p:nvGrpSpPr>
-        <p:cNvPr id="1" name=""/>
-        <p:cNvGrpSpPr/>
-        <p:nvPr/>
-      </p:nvGrpSpPr>
-      <p:grpSpPr>
-        <a:xfrm>
-          <a:off x="0" y="0"/>
-          <a:ext cx="0" cy="0"/>
-          <a:chOff x="0" y="0"/>
-          <a:chExt cx="0" cy="0"/>
-        </a:xfrm>
-      </p:grpSpPr>
-      <p:sp>
-        <p:nvSpPr>
-          <p:cNvPr id="2" name="Title 1"/>
-          <p:cNvSpPr>
-            <a:spLocks noGrp="1"/>
-          </p:cNvSpPr>
-          <p:nvPr>
-            <p:ph type="title"/>
-          </p:nvPr>
-        </p:nvSpPr>
-        <p:spPr/>
-        <p:txBody>
-          <a:bodyPr/>
-          <a:lstStyle/>
-          <a:p>
-            <a:r>
-              <a:rPr lang="en-US" dirty="0" smtClean="0"/>
-              <a:t>Use Case</a:t>
-            </a:r>
-            <a:endParaRPr lang="en-US" dirty="0"/>
-          </a:p>
-        </p:txBody>
-      </p:sp>
-      <p:sp>
-        <p:nvSpPr>
-          <p:cNvPr id="3" name="Content Placeholder 2"/>
-          <p:cNvSpPr>
-            <a:spLocks noGrp="1"/>
-          </p:cNvSpPr>
-          <p:nvPr>
-            <p:ph idx="1"/>
-          </p:nvPr>
-        </p:nvSpPr>
-        <p:spPr/>
-        <p:txBody>
-          <a:bodyPr/>
-          <a:lstStyle/>
-          <a:p>
-            <a:r>
-              <a:rPr lang="en-US" i="1" dirty="0"/>
-              <a:t>“A use case is the </a:t>
-            </a:r>
-            <a:r>
-              <a:rPr lang="en-US" i="1" u="sng" dirty="0"/>
-              <a:t>specification</a:t>
-            </a:r>
-            <a:r>
-              <a:rPr lang="en-US" i="1" dirty="0"/>
-              <a:t> of a </a:t>
-            </a:r>
-            <a:r>
-              <a:rPr lang="en-US" i="1" u="sng" dirty="0"/>
-              <a:t>set of actions</a:t>
-            </a:r>
-            <a:r>
-              <a:rPr lang="en-US" i="1" dirty="0"/>
-              <a:t> performed by a </a:t>
-            </a:r>
-            <a:r>
-              <a:rPr lang="en-US" i="1" u="sng" dirty="0"/>
-              <a:t>system</a:t>
-            </a:r>
-            <a:r>
-              <a:rPr lang="en-US" i="1" dirty="0"/>
-              <a:t>, </a:t>
-            </a:r>
-            <a:r>
-              <a:rPr lang="en-US" i="1" dirty="0" smtClean="0"/>
-              <a:t>which yields an </a:t>
-            </a:r>
-            <a:r>
-              <a:rPr lang="en-US" i="1" dirty="0"/>
-              <a:t>observable result that is, typically, </a:t>
-            </a:r>
-            <a:r>
-              <a:rPr lang="en-US" i="1" dirty="0" smtClean="0"/>
-              <a:t>of value </a:t>
-            </a:r>
-            <a:r>
-              <a:rPr lang="en-US" i="1" dirty="0"/>
-              <a:t>for one or more </a:t>
-            </a:r>
-            <a:r>
-              <a:rPr lang="en-US" i="1" u="sng" dirty="0"/>
-              <a:t>actors</a:t>
-            </a:r>
-            <a:r>
-              <a:rPr lang="en-US" i="1" dirty="0"/>
-              <a:t> or </a:t>
-            </a:r>
-            <a:r>
-              <a:rPr lang="en-US" i="1" dirty="0" smtClean="0"/>
-              <a:t>other stakeholders </a:t>
-            </a:r>
-            <a:r>
-              <a:rPr lang="en-US" i="1" dirty="0"/>
-              <a:t>of the system</a:t>
-            </a:r>
-            <a:r>
-              <a:rPr lang="en-US" i="1" dirty="0" smtClean="0"/>
-              <a:t>.”</a:t>
-            </a:r>
-          </a:p>
-        </p:txBody>
-      </p:sp>
-    </p:spTree>
-    <p:extLst>
-      <p:ext uri="{BB962C8B-B14F-4D97-AF65-F5344CB8AC3E}">
-        <p14:creationId xmlns:p14="http://schemas.microsoft.com/office/powerpoint/2010/main" val="2727640192"/>
-      </p:ext>
-    </p:extLst>
-  </p:cSld>
-  <p:clrMapOvr>
-    <a:masterClrMapping/>
-  </p:clrMapOvr>
-  <p:timing>
-    <p:tnLst>
-      <p:par>
-        <p:cTn id="1" dur="indefinite" restart="never" nodeType="tmRoot"/>
-      </p:par>
-    </p:tnLst>
-  </p:timing>
-</p:sld>
-</file>
-
-<file path=ppt/slides/slide20.xml><?xml version="1.0" encoding="utf-8"?>
+<file path=ppt/slides/slide19.xml><?xml version="1.0" encoding="utf-8"?>
 <p:sld xmlns:a="http://schemas.openxmlformats.org/drawingml/2006/main" xmlns:r="http://schemas.openxmlformats.org/officeDocument/2006/relationships" xmlns:p="http://schemas.openxmlformats.org/presentationml/2006/main">
   <p:cSld>
     <p:spTree>
@@ -13707,7 +11878,149 @@
 </p:sld>
 </file>
 
-<file path=ppt/slides/slide21.xml><?xml version="1.0" encoding="utf-8"?>
+<file path=ppt/slides/slide2.xml><?xml version="1.0" encoding="utf-8"?>
+<p:sld xmlns:a="http://schemas.openxmlformats.org/drawingml/2006/main" xmlns:r="http://schemas.openxmlformats.org/officeDocument/2006/relationships" xmlns:p="http://schemas.openxmlformats.org/presentationml/2006/main">
+  <p:cSld>
+    <p:spTree>
+      <p:nvGrpSpPr>
+        <p:cNvPr id="1" name=""/>
+        <p:cNvGrpSpPr/>
+        <p:nvPr/>
+      </p:nvGrpSpPr>
+      <p:grpSpPr>
+        <a:xfrm>
+          <a:off x="0" y="0"/>
+          <a:ext cx="0" cy="0"/>
+          <a:chOff x="0" y="0"/>
+          <a:chExt cx="0" cy="0"/>
+        </a:xfrm>
+      </p:grpSpPr>
+      <p:sp>
+        <p:nvSpPr>
+          <p:cNvPr id="2" name="Title 1"/>
+          <p:cNvSpPr>
+            <a:spLocks noGrp="1"/>
+          </p:cNvSpPr>
+          <p:nvPr>
+            <p:ph type="title"/>
+          </p:nvPr>
+        </p:nvSpPr>
+        <p:spPr/>
+        <p:txBody>
+          <a:bodyPr/>
+          <a:lstStyle/>
+          <a:p>
+            <a:r>
+              <a:rPr lang="en-US" dirty="0" smtClean="0"/>
+              <a:t>Use Case</a:t>
+            </a:r>
+            <a:endParaRPr lang="en-US" dirty="0"/>
+          </a:p>
+        </p:txBody>
+      </p:sp>
+      <p:sp>
+        <p:nvSpPr>
+          <p:cNvPr id="3" name="Content Placeholder 2"/>
+          <p:cNvSpPr>
+            <a:spLocks noGrp="1"/>
+          </p:cNvSpPr>
+          <p:nvPr>
+            <p:ph idx="1"/>
+          </p:nvPr>
+        </p:nvSpPr>
+        <p:spPr/>
+        <p:txBody>
+          <a:bodyPr/>
+          <a:lstStyle/>
+          <a:p>
+            <a:r>
+              <a:rPr lang="en-US" i="1" dirty="0"/>
+              <a:t>“A use case is the </a:t>
+            </a:r>
+            <a:r>
+              <a:rPr lang="en-US" i="1" u="sng" dirty="0"/>
+              <a:t>specification</a:t>
+            </a:r>
+            <a:r>
+              <a:rPr lang="en-US" i="1" dirty="0"/>
+              <a:t> of a </a:t>
+            </a:r>
+            <a:r>
+              <a:rPr lang="en-US" i="1" u="sng" dirty="0"/>
+              <a:t>set of actions</a:t>
+            </a:r>
+            <a:r>
+              <a:rPr lang="en-US" i="1" dirty="0"/>
+              <a:t> performed by a </a:t>
+            </a:r>
+            <a:r>
+              <a:rPr lang="en-US" i="1" u="sng" dirty="0"/>
+              <a:t>system</a:t>
+            </a:r>
+            <a:r>
+              <a:rPr lang="en-US" i="1" dirty="0"/>
+              <a:t>, </a:t>
+            </a:r>
+            <a:r>
+              <a:rPr lang="en-US" i="1" dirty="0" smtClean="0"/>
+              <a:t>which yields an </a:t>
+            </a:r>
+            <a:r>
+              <a:rPr lang="en-US" i="1" dirty="0"/>
+              <a:t>observable result that is, typically, </a:t>
+            </a:r>
+            <a:r>
+              <a:rPr lang="en-US" i="1" dirty="0" smtClean="0"/>
+              <a:t>of value </a:t>
+            </a:r>
+            <a:r>
+              <a:rPr lang="en-US" i="1" dirty="0"/>
+              <a:t>for one or more </a:t>
+            </a:r>
+            <a:r>
+              <a:rPr lang="en-US" i="1" u="sng" dirty="0"/>
+              <a:t>actors</a:t>
+            </a:r>
+            <a:r>
+              <a:rPr lang="en-US" i="1" dirty="0"/>
+              <a:t> or </a:t>
+            </a:r>
+            <a:r>
+              <a:rPr lang="en-US" i="1" dirty="0" smtClean="0"/>
+              <a:t>other stakeholders </a:t>
+            </a:r>
+            <a:r>
+              <a:rPr lang="en-US" i="1" dirty="0"/>
+              <a:t>of the system</a:t>
+            </a:r>
+            <a:r>
+              <a:rPr lang="en-US" i="1" dirty="0" smtClean="0"/>
+              <a:t>.”</a:t>
+            </a:r>
+          </a:p>
+        </p:txBody>
+      </p:sp>
+    </p:spTree>
+    <p:extLst>
+      <p:ext uri="{BB962C8B-B14F-4D97-AF65-F5344CB8AC3E}">
+        <p14:creationId xmlns:p14="http://schemas.microsoft.com/office/powerpoint/2010/main" val="2727640192"/>
+      </p:ext>
+    </p:extLst>
+  </p:cSld>
+  <p:clrMapOvr>
+    <a:masterClrMapping/>
+  </p:clrMapOvr>
+  <p:timing>
+    <p:tnLst>
+      <p:par>
+        <p:cTn id="1" dur="indefinite" restart="never" nodeType="tmRoot"/>
+      </p:par>
+    </p:tnLst>
+  </p:timing>
+</p:sld>
+</file>
+
+<file path=ppt/slides/slide20.xml><?xml version="1.0" encoding="utf-8"?>
 <p:sld xmlns:a="http://schemas.openxmlformats.org/drawingml/2006/main" xmlns:r="http://schemas.openxmlformats.org/officeDocument/2006/relationships" xmlns:p="http://schemas.openxmlformats.org/presentationml/2006/main">
   <p:cSld>
     <p:spTree>
@@ -14400,7 +12713,7 @@
 </p:sld>
 </file>
 
-<file path=ppt/slides/slide22.xml><?xml version="1.0" encoding="utf-8"?>
+<file path=ppt/slides/slide21.xml><?xml version="1.0" encoding="utf-8"?>
 <p:sld xmlns:a="http://schemas.openxmlformats.org/drawingml/2006/main" xmlns:r="http://schemas.openxmlformats.org/officeDocument/2006/relationships" xmlns:p="http://schemas.openxmlformats.org/presentationml/2006/main">
   <p:cSld>
     <p:spTree>
@@ -14524,7 +12837,7 @@
 </p:sld>
 </file>
 
-<file path=ppt/slides/slide23.xml><?xml version="1.0" encoding="utf-8"?>
+<file path=ppt/slides/slide22.xml><?xml version="1.0" encoding="utf-8"?>
 <p:sld xmlns:a="http://schemas.openxmlformats.org/drawingml/2006/main" xmlns:r="http://schemas.openxmlformats.org/officeDocument/2006/relationships" xmlns:p="http://schemas.openxmlformats.org/presentationml/2006/main">
   <p:cSld>
     <p:spTree>
@@ -14689,7 +13002,7 @@
 </p:sld>
 </file>
 
-<file path=ppt/slides/slide24.xml><?xml version="1.0" encoding="utf-8"?>
+<file path=ppt/slides/slide23.xml><?xml version="1.0" encoding="utf-8"?>
 <p:sld xmlns:a="http://schemas.openxmlformats.org/drawingml/2006/main" xmlns:r="http://schemas.openxmlformats.org/officeDocument/2006/relationships" xmlns:p="http://schemas.openxmlformats.org/presentationml/2006/main">
   <p:cSld>
     <p:spTree>
@@ -14905,6 +13218,85 @@
 </p:sld>
 </file>
 
+<file path=ppt/slides/slide24.xml><?xml version="1.0" encoding="utf-8"?>
+<p:sld xmlns:a="http://schemas.openxmlformats.org/drawingml/2006/main" xmlns:r="http://schemas.openxmlformats.org/officeDocument/2006/relationships" xmlns:p="http://schemas.openxmlformats.org/presentationml/2006/main">
+  <p:cSld>
+    <p:spTree>
+      <p:nvGrpSpPr>
+        <p:cNvPr id="1" name=""/>
+        <p:cNvGrpSpPr/>
+        <p:nvPr/>
+      </p:nvGrpSpPr>
+      <p:grpSpPr>
+        <a:xfrm>
+          <a:off x="0" y="0"/>
+          <a:ext cx="0" cy="0"/>
+          <a:chOff x="0" y="0"/>
+          <a:chExt cx="0" cy="0"/>
+        </a:xfrm>
+      </p:grpSpPr>
+      <p:sp>
+        <p:nvSpPr>
+          <p:cNvPr id="2" name="Title 1"/>
+          <p:cNvSpPr>
+            <a:spLocks noGrp="1"/>
+          </p:cNvSpPr>
+          <p:nvPr>
+            <p:ph type="title"/>
+          </p:nvPr>
+        </p:nvSpPr>
+        <p:spPr/>
+        <p:txBody>
+          <a:bodyPr/>
+          <a:lstStyle/>
+          <a:p>
+            <a:r>
+              <a:rPr lang="en-US" dirty="0" smtClean="0"/>
+              <a:t>Results</a:t>
+            </a:r>
+            <a:endParaRPr lang="en-US" dirty="0"/>
+          </a:p>
+        </p:txBody>
+      </p:sp>
+      <p:sp>
+        <p:nvSpPr>
+          <p:cNvPr id="3" name="Content Placeholder 2"/>
+          <p:cNvSpPr>
+            <a:spLocks noGrp="1"/>
+          </p:cNvSpPr>
+          <p:nvPr>
+            <p:ph idx="1"/>
+          </p:nvPr>
+        </p:nvSpPr>
+        <p:spPr/>
+        <p:txBody>
+          <a:bodyPr/>
+          <a:lstStyle/>
+          <a:p>
+            <a:endParaRPr lang="en-US"/>
+          </a:p>
+        </p:txBody>
+      </p:sp>
+    </p:spTree>
+    <p:extLst>
+      <p:ext uri="{BB962C8B-B14F-4D97-AF65-F5344CB8AC3E}">
+        <p14:creationId xmlns:p14="http://schemas.microsoft.com/office/powerpoint/2010/main" val="2602455632"/>
+      </p:ext>
+    </p:extLst>
+  </p:cSld>
+  <p:clrMapOvr>
+    <a:masterClrMapping/>
+  </p:clrMapOvr>
+  <p:timing>
+    <p:tnLst>
+      <p:par>
+        <p:cTn id="1" dur="indefinite" restart="never" nodeType="tmRoot"/>
+      </p:par>
+    </p:tnLst>
+  </p:timing>
+</p:sld>
+</file>
+
 <file path=ppt/slides/slide25.xml><?xml version="1.0" encoding="utf-8"?>
 <p:sld xmlns:a="http://schemas.openxmlformats.org/drawingml/2006/main" xmlns:r="http://schemas.openxmlformats.org/officeDocument/2006/relationships" xmlns:p="http://schemas.openxmlformats.org/presentationml/2006/main">
   <p:cSld>
@@ -14967,7 +13359,7 @@
     </p:spTree>
     <p:extLst>
       <p:ext uri="{BB962C8B-B14F-4D97-AF65-F5344CB8AC3E}">
-        <p14:creationId xmlns:p14="http://schemas.microsoft.com/office/powerpoint/2010/main" val="2602455632"/>
+        <p14:creationId xmlns:p14="http://schemas.microsoft.com/office/powerpoint/2010/main" val="1854856300"/>
       </p:ext>
     </p:extLst>
   </p:cSld>
@@ -15018,85 +13410,6 @@
           <a:p>
             <a:r>
               <a:rPr lang="en-US" dirty="0" smtClean="0"/>
-              <a:t>Results</a:t>
-            </a:r>
-            <a:endParaRPr lang="en-US" dirty="0"/>
-          </a:p>
-        </p:txBody>
-      </p:sp>
-      <p:sp>
-        <p:nvSpPr>
-          <p:cNvPr id="3" name="Content Placeholder 2"/>
-          <p:cNvSpPr>
-            <a:spLocks noGrp="1"/>
-          </p:cNvSpPr>
-          <p:nvPr>
-            <p:ph idx="1"/>
-          </p:nvPr>
-        </p:nvSpPr>
-        <p:spPr/>
-        <p:txBody>
-          <a:bodyPr/>
-          <a:lstStyle/>
-          <a:p>
-            <a:endParaRPr lang="en-US"/>
-          </a:p>
-        </p:txBody>
-      </p:sp>
-    </p:spTree>
-    <p:extLst>
-      <p:ext uri="{BB962C8B-B14F-4D97-AF65-F5344CB8AC3E}">
-        <p14:creationId xmlns:p14="http://schemas.microsoft.com/office/powerpoint/2010/main" val="1854856300"/>
-      </p:ext>
-    </p:extLst>
-  </p:cSld>
-  <p:clrMapOvr>
-    <a:masterClrMapping/>
-  </p:clrMapOvr>
-  <p:timing>
-    <p:tnLst>
-      <p:par>
-        <p:cTn id="1" dur="indefinite" restart="never" nodeType="tmRoot"/>
-      </p:par>
-    </p:tnLst>
-  </p:timing>
-</p:sld>
-</file>
-
-<file path=ppt/slides/slide27.xml><?xml version="1.0" encoding="utf-8"?>
-<p:sld xmlns:a="http://schemas.openxmlformats.org/drawingml/2006/main" xmlns:r="http://schemas.openxmlformats.org/officeDocument/2006/relationships" xmlns:p="http://schemas.openxmlformats.org/presentationml/2006/main">
-  <p:cSld>
-    <p:spTree>
-      <p:nvGrpSpPr>
-        <p:cNvPr id="1" name=""/>
-        <p:cNvGrpSpPr/>
-        <p:nvPr/>
-      </p:nvGrpSpPr>
-      <p:grpSpPr>
-        <a:xfrm>
-          <a:off x="0" y="0"/>
-          <a:ext cx="0" cy="0"/>
-          <a:chOff x="0" y="0"/>
-          <a:chExt cx="0" cy="0"/>
-        </a:xfrm>
-      </p:grpSpPr>
-      <p:sp>
-        <p:nvSpPr>
-          <p:cNvPr id="2" name="Title 1"/>
-          <p:cNvSpPr>
-            <a:spLocks noGrp="1"/>
-          </p:cNvSpPr>
-          <p:nvPr>
-            <p:ph type="title"/>
-          </p:nvPr>
-        </p:nvSpPr>
-        <p:spPr/>
-        <p:txBody>
-          <a:bodyPr/>
-          <a:lstStyle/>
-          <a:p>
-            <a:r>
-              <a:rPr lang="en-US" dirty="0" smtClean="0"/>
               <a:t>Soundness vs. Completeness</a:t>
             </a:r>
             <a:endParaRPr lang="en-US" dirty="0"/>
@@ -15169,7 +13482,7 @@
 </p:sld>
 </file>
 
-<file path=ppt/slides/slide28.xml><?xml version="1.0" encoding="utf-8"?>
+<file path=ppt/slides/slide27.xml><?xml version="1.0" encoding="utf-8"?>
 <p:sld xmlns:a="http://schemas.openxmlformats.org/drawingml/2006/main" xmlns:r="http://schemas.openxmlformats.org/officeDocument/2006/relationships" xmlns:p="http://schemas.openxmlformats.org/presentationml/2006/main">
   <p:cSld>
     <p:spTree>
@@ -18317,6 +16630,109 @@
           </a:fontRef>
         </p:style>
       </p:cxnSp>
+      <p:grpSp>
+        <p:nvGrpSpPr>
+          <p:cNvPr id="20" name="Group 19"/>
+          <p:cNvGrpSpPr/>
+          <p:nvPr/>
+        </p:nvGrpSpPr>
+        <p:grpSpPr>
+          <a:xfrm>
+            <a:off x="2286000" y="3200400"/>
+            <a:ext cx="1475318" cy="1030369"/>
+            <a:chOff x="2438400" y="2515434"/>
+            <a:chExt cx="1475318" cy="1030369"/>
+          </a:xfrm>
+        </p:grpSpPr>
+        <p:sp>
+          <p:nvSpPr>
+            <p:cNvPr id="18" name="Explosion 1 17"/>
+            <p:cNvSpPr/>
+            <p:nvPr/>
+          </p:nvSpPr>
+          <p:spPr>
+            <a:xfrm>
+              <a:off x="2438400" y="2515434"/>
+              <a:ext cx="1475318" cy="1030369"/>
+            </a:xfrm>
+            <a:prstGeom prst="irregularSeal1">
+              <a:avLst/>
+            </a:prstGeom>
+            <a:solidFill>
+              <a:schemeClr val="bg1"/>
+            </a:solidFill>
+            <a:ln>
+              <a:solidFill>
+                <a:schemeClr val="tx1"/>
+              </a:solidFill>
+            </a:ln>
+          </p:spPr>
+          <p:style>
+            <a:lnRef idx="1">
+              <a:schemeClr val="accent1"/>
+            </a:lnRef>
+            <a:fillRef idx="3">
+              <a:schemeClr val="accent1"/>
+            </a:fillRef>
+            <a:effectRef idx="2">
+              <a:schemeClr val="accent1"/>
+            </a:effectRef>
+            <a:fontRef idx="minor">
+              <a:schemeClr val="lt1"/>
+            </a:fontRef>
+          </p:style>
+          <p:txBody>
+            <a:bodyPr rtlCol="0" anchor="ctr"/>
+            <a:lstStyle/>
+            <a:p>
+              <a:pPr algn="ctr"/>
+              <a:endParaRPr lang="en-US" dirty="0">
+                <a:solidFill>
+                  <a:schemeClr val="tx1"/>
+                </a:solidFill>
+                <a:latin typeface="小塚ゴシック Pro M" pitchFamily="34" charset="-128"/>
+                <a:ea typeface="小塚ゴシック Pro M" pitchFamily="34" charset="-128"/>
+              </a:endParaRPr>
+            </a:p>
+          </p:txBody>
+        </p:sp>
+        <p:sp>
+          <p:nvSpPr>
+            <p:cNvPr id="19" name="TextBox 18"/>
+            <p:cNvSpPr txBox="1"/>
+            <p:nvPr/>
+          </p:nvSpPr>
+          <p:spPr>
+            <a:xfrm>
+              <a:off x="2590800" y="2845952"/>
+              <a:ext cx="1170518" cy="369332"/>
+            </a:xfrm>
+            <a:prstGeom prst="rect">
+              <a:avLst/>
+            </a:prstGeom>
+            <a:noFill/>
+          </p:spPr>
+          <p:txBody>
+            <a:bodyPr wrap="square" rtlCol="0">
+              <a:spAutoFit/>
+            </a:bodyPr>
+            <a:lstStyle/>
+            <a:p>
+              <a:r>
+                <a:rPr lang="en-US" dirty="0" smtClean="0">
+                  <a:latin typeface="小塚ゴシック Pro M" pitchFamily="34" charset="-128"/>
+                  <a:ea typeface="小塚ゴシック Pro M" pitchFamily="34" charset="-128"/>
+                </a:rPr>
+                <a:t>COMMIT</a:t>
+              </a:r>
+              <a:endParaRPr lang="en-US" dirty="0">
+                <a:latin typeface="小塚ゴシック Pro M" pitchFamily="34" charset="-128"/>
+                <a:ea typeface="小塚ゴシック Pro M" pitchFamily="34" charset="-128"/>
+              </a:endParaRPr>
+            </a:p>
+          </p:txBody>
+        </p:sp>
+      </p:grpSp>
     </p:spTree>
     <p:extLst>
       <p:ext uri="{BB962C8B-B14F-4D97-AF65-F5344CB8AC3E}">
@@ -18863,42 +17279,42 @@
       </p:grpSp>
       <p:grpSp>
         <p:nvGrpSpPr>
-          <p:cNvPr id="22" name="Group 21"/>
+          <p:cNvPr id="24" name="Group 23"/>
           <p:cNvGrpSpPr/>
           <p:nvPr/>
         </p:nvGrpSpPr>
         <p:grpSpPr>
           <a:xfrm>
-            <a:off x="2687745" y="2998641"/>
-            <a:ext cx="1752600" cy="1801499"/>
-            <a:chOff x="2687745" y="2998641"/>
-            <a:chExt cx="1752600" cy="1801499"/>
+            <a:off x="4648200" y="1219200"/>
+            <a:ext cx="1447800" cy="1192827"/>
+            <a:chOff x="2331830" y="2616530"/>
+            <a:chExt cx="1447800" cy="1192827"/>
           </a:xfrm>
         </p:grpSpPr>
         <p:sp>
           <p:nvSpPr>
-            <p:cNvPr id="21" name="Cloud 20"/>
+            <p:cNvPr id="17" name="Explosion 1 16"/>
             <p:cNvSpPr/>
             <p:nvPr/>
           </p:nvSpPr>
           <p:spPr>
             <a:xfrm>
-              <a:off x="2687745" y="2998641"/>
-              <a:ext cx="1752600" cy="1062145"/>
+              <a:off x="2331830" y="2616530"/>
+              <a:ext cx="1447800" cy="1192827"/>
             </a:xfrm>
-            <a:prstGeom prst="cloud">
+            <a:prstGeom prst="irregularSeal1">
               <a:avLst/>
             </a:prstGeom>
           </p:spPr>
           <p:style>
             <a:lnRef idx="1">
-              <a:schemeClr val="dk1"/>
+              <a:schemeClr val="accent6"/>
             </a:lnRef>
             <a:fillRef idx="3">
-              <a:schemeClr val="dk1"/>
+              <a:schemeClr val="accent6"/>
             </a:fillRef>
             <a:effectRef idx="2">
-              <a:schemeClr val="dk1"/>
+              <a:schemeClr val="accent6"/>
             </a:effectRef>
             <a:fontRef idx="minor">
               <a:schemeClr val="lt1"/>
@@ -18913,120 +17329,107 @@
             </a:p>
           </p:txBody>
         </p:sp>
-        <p:grpSp>
-          <p:nvGrpSpPr>
-            <p:cNvPr id="20" name="Group 19"/>
-            <p:cNvGrpSpPr/>
+        <p:sp>
+          <p:nvSpPr>
+            <p:cNvPr id="23" name="Explosion 1 22"/>
+            <p:cNvSpPr/>
             <p:nvPr/>
-          </p:nvGrpSpPr>
-          <p:grpSpPr>
+          </p:nvSpPr>
+          <p:spPr>
             <a:xfrm>
-              <a:off x="2819400" y="3272135"/>
-              <a:ext cx="1489291" cy="1528005"/>
-              <a:chOff x="2549308" y="3530612"/>
-              <a:chExt cx="1489291" cy="1528005"/>
+              <a:off x="2667000" y="2902831"/>
+              <a:ext cx="746952" cy="620224"/>
             </a:xfrm>
-          </p:grpSpPr>
-          <p:sp>
-            <p:nvSpPr>
-              <p:cNvPr id="18" name="Lightning Bolt 17"/>
-              <p:cNvSpPr/>
-              <p:nvPr/>
-            </p:nvSpPr>
-            <p:spPr>
-              <a:xfrm>
-                <a:off x="2971799" y="3908392"/>
-                <a:ext cx="644308" cy="1150225"/>
-              </a:xfrm>
-              <a:prstGeom prst="lightningBolt">
-                <a:avLst/>
-              </a:prstGeom>
+            <a:prstGeom prst="irregularSeal1">
+              <a:avLst/>
+            </a:prstGeom>
+          </p:spPr>
+          <p:style>
+            <a:lnRef idx="1">
+              <a:schemeClr val="accent2"/>
+            </a:lnRef>
+            <a:fillRef idx="3">
+              <a:schemeClr val="accent2"/>
+            </a:fillRef>
+            <a:effectRef idx="2">
+              <a:schemeClr val="accent2"/>
+            </a:effectRef>
+            <a:fontRef idx="minor">
+              <a:schemeClr val="lt1"/>
+            </a:fontRef>
+          </p:style>
+          <p:txBody>
+            <a:bodyPr rtlCol="0" anchor="ctr"/>
+            <a:lstStyle/>
+            <a:p>
+              <a:pPr algn="ctr"/>
+              <a:endParaRPr lang="en-US"/>
+            </a:p>
+          </p:txBody>
+        </p:sp>
+      </p:grpSp>
+      <p:sp>
+        <p:nvSpPr>
+          <p:cNvPr id="25" name="Cloud Callout 24"/>
+          <p:cNvSpPr/>
+          <p:nvPr/>
+        </p:nvSpPr>
+        <p:spPr>
+          <a:xfrm>
+            <a:off x="2057400" y="2265363"/>
+            <a:ext cx="1295400" cy="660622"/>
+          </a:xfrm>
+          <a:prstGeom prst="cloudCallout">
+            <a:avLst/>
+          </a:prstGeom>
+          <a:solidFill>
+            <a:schemeClr val="bg1"/>
+          </a:solidFill>
+          <a:ln>
+            <a:solidFill>
+              <a:schemeClr val="tx1"/>
+            </a:solidFill>
+          </a:ln>
+        </p:spPr>
+        <p:style>
+          <a:lnRef idx="1">
+            <a:schemeClr val="accent1"/>
+          </a:lnRef>
+          <a:fillRef idx="3">
+            <a:schemeClr val="accent1"/>
+          </a:fillRef>
+          <a:effectRef idx="2">
+            <a:schemeClr val="accent1"/>
+          </a:effectRef>
+          <a:fontRef idx="minor">
+            <a:schemeClr val="lt1"/>
+          </a:fontRef>
+        </p:style>
+        <p:txBody>
+          <a:bodyPr rtlCol="0" anchor="t"/>
+          <a:lstStyle/>
+          <a:p>
+            <a:pPr algn="ctr"/>
+            <a:r>
+              <a:rPr lang="en-US" sz="2400" dirty="0" smtClean="0">
+                <a:solidFill>
+                  <a:schemeClr val="tx1"/>
+                </a:solidFill>
+                <a:latin typeface="小塚ゴシック Pro M" pitchFamily="34" charset="-128"/>
+                <a:ea typeface="小塚ゴシック Pro M" pitchFamily="34" charset="-128"/>
+              </a:rPr>
+              <a:t>???</a:t>
+            </a:r>
+            <a:endParaRPr lang="en-US" sz="2400" dirty="0">
               <a:solidFill>
-                <a:srgbClr val="FFFF00"/>
+                <a:schemeClr val="tx1"/>
               </a:solidFill>
-            </p:spPr>
-            <p:style>
-              <a:lnRef idx="1">
-                <a:schemeClr val="accent1"/>
-              </a:lnRef>
-              <a:fillRef idx="3">
-                <a:schemeClr val="accent1"/>
-              </a:fillRef>
-              <a:effectRef idx="2">
-                <a:schemeClr val="accent1"/>
-              </a:effectRef>
-              <a:fontRef idx="minor">
-                <a:schemeClr val="lt1"/>
-              </a:fontRef>
-            </p:style>
-            <p:txBody>
-              <a:bodyPr rtlCol="0" anchor="ctr"/>
-              <a:lstStyle/>
-              <a:p>
-                <a:pPr algn="ctr"/>
-                <a:endParaRPr lang="en-US" dirty="0"/>
-              </a:p>
-            </p:txBody>
-          </p:sp>
-          <p:sp>
-            <p:nvSpPr>
-              <p:cNvPr id="19" name="TextBox 18"/>
-              <p:cNvSpPr txBox="1"/>
-              <p:nvPr/>
-            </p:nvSpPr>
-            <p:spPr>
-              <a:xfrm>
-                <a:off x="2549308" y="3530612"/>
-                <a:ext cx="1489291" cy="461665"/>
-              </a:xfrm>
-              <a:prstGeom prst="rect">
-                <a:avLst/>
-              </a:prstGeom>
-              <a:noFill/>
-              <a:effectLst/>
-            </p:spPr>
-            <p:txBody>
-              <a:bodyPr wrap="square" rtlCol="0">
-                <a:spAutoFit/>
-              </a:bodyPr>
-              <a:lstStyle/>
-              <a:p>
-                <a:r>
-                  <a:rPr lang="en-US" sz="2400" b="1" dirty="0" smtClean="0">
-                    <a:solidFill>
-                      <a:schemeClr val="bg1"/>
-                    </a:solidFill>
-                    <a:effectLst>
-                      <a:outerShdw blurRad="50800" dist="38100" dir="2700000" algn="tl" rotWithShape="0">
-                        <a:prstClr val="black">
-                          <a:alpha val="40000"/>
-                        </a:prstClr>
-                      </a:outerShdw>
-                    </a:effectLst>
-                    <a:latin typeface="小塚ゴシック Pro L" pitchFamily="34" charset="-128"/>
-                    <a:ea typeface="小塚ゴシック Pro L" pitchFamily="34" charset="-128"/>
-                  </a:rPr>
-                  <a:t>COMMIT!</a:t>
-                </a:r>
-                <a:endParaRPr lang="en-US" sz="2400" b="1" dirty="0">
-                  <a:solidFill>
-                    <a:schemeClr val="bg1"/>
-                  </a:solidFill>
-                  <a:effectLst>
-                    <a:outerShdw blurRad="50800" dist="38100" dir="2700000" algn="tl" rotWithShape="0">
-                      <a:prstClr val="black">
-                        <a:alpha val="40000"/>
-                      </a:prstClr>
-                    </a:outerShdw>
-                  </a:effectLst>
-                  <a:latin typeface="小塚ゴシック Pro L" pitchFamily="34" charset="-128"/>
-                  <a:ea typeface="小塚ゴシック Pro L" pitchFamily="34" charset="-128"/>
-                </a:endParaRPr>
-              </a:p>
-            </p:txBody>
-          </p:sp>
-        </p:grpSp>
-      </p:grpSp>
+              <a:latin typeface="小塚ゴシック Pro M" pitchFamily="34" charset="-128"/>
+              <a:ea typeface="小塚ゴシック Pro M" pitchFamily="34" charset="-128"/>
+            </a:endParaRPr>
+          </a:p>
+        </p:txBody>
+      </p:sp>
     </p:spTree>
     <p:extLst>
       <p:ext uri="{BB962C8B-B14F-4D97-AF65-F5344CB8AC3E}">
@@ -19064,6 +17467,52 @@
           <a:chExt cx="0" cy="0"/>
         </a:xfrm>
       </p:grpSpPr>
+      <p:sp>
+        <p:nvSpPr>
+          <p:cNvPr id="61" name="Rectangle 60"/>
+          <p:cNvSpPr/>
+          <p:nvPr/>
+        </p:nvSpPr>
+        <p:spPr>
+          <a:xfrm>
+            <a:off x="533400" y="3988130"/>
+            <a:ext cx="8153400" cy="2641270"/>
+          </a:xfrm>
+          <a:prstGeom prst="rect">
+            <a:avLst/>
+          </a:prstGeom>
+          <a:solidFill>
+            <a:srgbClr val="00FF00">
+              <a:alpha val="23922"/>
+            </a:srgbClr>
+          </a:solidFill>
+          <a:ln>
+            <a:noFill/>
+          </a:ln>
+        </p:spPr>
+        <p:style>
+          <a:lnRef idx="1">
+            <a:schemeClr val="accent3"/>
+          </a:lnRef>
+          <a:fillRef idx="3">
+            <a:schemeClr val="accent3"/>
+          </a:fillRef>
+          <a:effectRef idx="2">
+            <a:schemeClr val="accent3"/>
+          </a:effectRef>
+          <a:fontRef idx="minor">
+            <a:schemeClr val="lt1"/>
+          </a:fontRef>
+        </p:style>
+        <p:txBody>
+          <a:bodyPr rtlCol="0" anchor="ctr"/>
+          <a:lstStyle/>
+          <a:p>
+            <a:pPr algn="ctr"/>
+            <a:endParaRPr lang="en-US"/>
+          </a:p>
+        </p:txBody>
+      </p:sp>
       <p:sp>
         <p:nvSpPr>
           <p:cNvPr id="7" name="Cloud 6"/>
@@ -19185,52 +17634,6 @@
               <a:latin typeface="小塚ゴシック Pro L" pitchFamily="34" charset="-128"/>
               <a:ea typeface="小塚ゴシック Pro L" pitchFamily="34" charset="-128"/>
             </a:endParaRPr>
-          </a:p>
-        </p:txBody>
-      </p:sp>
-      <p:sp>
-        <p:nvSpPr>
-          <p:cNvPr id="61" name="Rectangle 60"/>
-          <p:cNvSpPr/>
-          <p:nvPr/>
-        </p:nvSpPr>
-        <p:spPr>
-          <a:xfrm>
-            <a:off x="533400" y="3988130"/>
-            <a:ext cx="8153400" cy="2641270"/>
-          </a:xfrm>
-          <a:prstGeom prst="rect">
-            <a:avLst/>
-          </a:prstGeom>
-          <a:solidFill>
-            <a:srgbClr val="00FF00">
-              <a:alpha val="23922"/>
-            </a:srgbClr>
-          </a:solidFill>
-          <a:ln>
-            <a:noFill/>
-          </a:ln>
-        </p:spPr>
-        <p:style>
-          <a:lnRef idx="1">
-            <a:schemeClr val="accent3"/>
-          </a:lnRef>
-          <a:fillRef idx="3">
-            <a:schemeClr val="accent3"/>
-          </a:fillRef>
-          <a:effectRef idx="2">
-            <a:schemeClr val="accent3"/>
-          </a:effectRef>
-          <a:fontRef idx="minor">
-            <a:schemeClr val="lt1"/>
-          </a:fontRef>
-        </p:style>
-        <p:txBody>
-          <a:bodyPr rtlCol="0" anchor="ctr"/>
-          <a:lstStyle/>
-          <a:p>
-            <a:pPr algn="ctr"/>
-            <a:endParaRPr lang="en-US"/>
           </a:p>
         </p:txBody>
       </p:sp>
@@ -20604,6 +19007,52 @@
       </p:grpSpPr>
       <p:sp>
         <p:nvSpPr>
+          <p:cNvPr id="61" name="Rectangle 60"/>
+          <p:cNvSpPr/>
+          <p:nvPr/>
+        </p:nvSpPr>
+        <p:spPr>
+          <a:xfrm>
+            <a:off x="533400" y="3988130"/>
+            <a:ext cx="8153400" cy="2641270"/>
+          </a:xfrm>
+          <a:prstGeom prst="rect">
+            <a:avLst/>
+          </a:prstGeom>
+          <a:solidFill>
+            <a:srgbClr val="00FF00">
+              <a:alpha val="23922"/>
+            </a:srgbClr>
+          </a:solidFill>
+          <a:ln>
+            <a:noFill/>
+          </a:ln>
+        </p:spPr>
+        <p:style>
+          <a:lnRef idx="1">
+            <a:schemeClr val="accent3"/>
+          </a:lnRef>
+          <a:fillRef idx="3">
+            <a:schemeClr val="accent3"/>
+          </a:fillRef>
+          <a:effectRef idx="2">
+            <a:schemeClr val="accent3"/>
+          </a:effectRef>
+          <a:fontRef idx="minor">
+            <a:schemeClr val="lt1"/>
+          </a:fontRef>
+        </p:style>
+        <p:txBody>
+          <a:bodyPr rtlCol="0" anchor="ctr"/>
+          <a:lstStyle/>
+          <a:p>
+            <a:pPr algn="ctr"/>
+            <a:endParaRPr lang="en-US"/>
+          </a:p>
+        </p:txBody>
+      </p:sp>
+      <p:sp>
+        <p:nvSpPr>
           <p:cNvPr id="7" name="Cloud 6"/>
           <p:cNvSpPr/>
           <p:nvPr/>
@@ -20647,52 +19096,6 @@
               <a:latin typeface="小塚ゴシック Pro L" pitchFamily="34" charset="-128"/>
               <a:ea typeface="小塚ゴシック Pro L" pitchFamily="34" charset="-128"/>
             </a:endParaRPr>
-          </a:p>
-        </p:txBody>
-      </p:sp>
-      <p:sp>
-        <p:nvSpPr>
-          <p:cNvPr id="61" name="Rectangle 60"/>
-          <p:cNvSpPr/>
-          <p:nvPr/>
-        </p:nvSpPr>
-        <p:spPr>
-          <a:xfrm>
-            <a:off x="533400" y="3988130"/>
-            <a:ext cx="8153400" cy="2641270"/>
-          </a:xfrm>
-          <a:prstGeom prst="rect">
-            <a:avLst/>
-          </a:prstGeom>
-          <a:solidFill>
-            <a:srgbClr val="00FF00">
-              <a:alpha val="23922"/>
-            </a:srgbClr>
-          </a:solidFill>
-          <a:ln>
-            <a:noFill/>
-          </a:ln>
-        </p:spPr>
-        <p:style>
-          <a:lnRef idx="1">
-            <a:schemeClr val="accent3"/>
-          </a:lnRef>
-          <a:fillRef idx="3">
-            <a:schemeClr val="accent3"/>
-          </a:fillRef>
-          <a:effectRef idx="2">
-            <a:schemeClr val="accent3"/>
-          </a:effectRef>
-          <a:fontRef idx="minor">
-            <a:schemeClr val="lt1"/>
-          </a:fontRef>
-        </p:style>
-        <p:txBody>
-          <a:bodyPr rtlCol="0" anchor="ctr"/>
-          <a:lstStyle/>
-          <a:p>
-            <a:pPr algn="ctr"/>
-            <a:endParaRPr lang="en-US"/>
           </a:p>
         </p:txBody>
       </p:sp>
@@ -22137,6 +20540,110 @@
           </p:txBody>
         </p:sp>
       </p:grpSp>
+      <p:grpSp>
+        <p:nvGrpSpPr>
+          <p:cNvPr id="54" name="Group 53"/>
+          <p:cNvGrpSpPr/>
+          <p:nvPr/>
+        </p:nvGrpSpPr>
+        <p:grpSpPr>
+          <a:xfrm>
+            <a:off x="2322305" y="4379831"/>
+            <a:ext cx="1475318" cy="1030369"/>
+            <a:chOff x="2438400" y="2515434"/>
+            <a:chExt cx="1475318" cy="1030369"/>
+          </a:xfrm>
+        </p:grpSpPr>
+        <p:sp>
+          <p:nvSpPr>
+            <p:cNvPr id="55" name="Explosion 1 54"/>
+            <p:cNvSpPr/>
+            <p:nvPr/>
+          </p:nvSpPr>
+          <p:spPr>
+            <a:xfrm>
+              <a:off x="2438400" y="2515434"/>
+              <a:ext cx="1475318" cy="1030369"/>
+            </a:xfrm>
+            <a:prstGeom prst="irregularSeal1">
+              <a:avLst/>
+            </a:prstGeom>
+            <a:solidFill>
+              <a:schemeClr val="bg1"/>
+            </a:solidFill>
+            <a:ln>
+              <a:solidFill>
+                <a:schemeClr val="tx1"/>
+              </a:solidFill>
+            </a:ln>
+          </p:spPr>
+          <p:style>
+            <a:lnRef idx="1">
+              <a:schemeClr val="accent1"/>
+            </a:lnRef>
+            <a:fillRef idx="3">
+              <a:schemeClr val="accent1"/>
+            </a:fillRef>
+            <a:effectRef idx="2">
+              <a:schemeClr val="accent1"/>
+            </a:effectRef>
+            <a:fontRef idx="minor">
+              <a:schemeClr val="lt1"/>
+            </a:fontRef>
+          </p:style>
+          <p:txBody>
+            <a:bodyPr rtlCol="0" anchor="ctr"/>
+            <a:lstStyle/>
+            <a:p>
+              <a:pPr algn="ctr"/>
+              <a:endParaRPr lang="en-US" dirty="0">
+                <a:solidFill>
+                  <a:schemeClr val="tx1"/>
+                </a:solidFill>
+                <a:latin typeface="小塚ゴシック Pro M" pitchFamily="34" charset="-128"/>
+                <a:ea typeface="小塚ゴシック Pro M" pitchFamily="34" charset="-128"/>
+              </a:endParaRPr>
+            </a:p>
+          </p:txBody>
+        </p:sp>
+        <p:sp>
+          <p:nvSpPr>
+            <p:cNvPr id="56" name="TextBox 55"/>
+            <p:cNvSpPr txBox="1"/>
+            <p:nvPr/>
+          </p:nvSpPr>
+          <p:spPr>
+            <a:xfrm>
+              <a:off x="2590800" y="2845952"/>
+              <a:ext cx="1170518" cy="369332"/>
+            </a:xfrm>
+            <a:prstGeom prst="rect">
+              <a:avLst/>
+            </a:prstGeom>
+            <a:noFill/>
+          </p:spPr>
+          <p:txBody>
+            <a:bodyPr wrap="square" rtlCol="0">
+              <a:spAutoFit/>
+            </a:bodyPr>
+            <a:lstStyle/>
+            <a:p>
+              <a:pPr algn="ctr"/>
+              <a:r>
+                <a:rPr lang="en-US" dirty="0" smtClean="0">
+                  <a:latin typeface="小塚ゴシック Pro M" pitchFamily="34" charset="-128"/>
+                  <a:ea typeface="小塚ゴシック Pro M" pitchFamily="34" charset="-128"/>
+                </a:rPr>
+                <a:t>COMMIT</a:t>
+              </a:r>
+              <a:endParaRPr lang="en-US" dirty="0">
+                <a:latin typeface="小塚ゴシック Pro M" pitchFamily="34" charset="-128"/>
+                <a:ea typeface="小塚ゴシック Pro M" pitchFamily="34" charset="-128"/>
+              </a:endParaRPr>
+            </a:p>
+          </p:txBody>
+        </p:sp>
+      </p:grpSp>
     </p:spTree>
     <p:extLst>
       <p:ext uri="{BB962C8B-B14F-4D97-AF65-F5344CB8AC3E}">

</xml_diff>

<commit_message>
Added results to the presentation...
</commit_message>
<xml_diff>
--- a/Presentation/yukon final presentation.pptx
+++ b/Presentation/yukon final presentation.pptx
@@ -12889,19 +12889,27 @@
         </p:nvSpPr>
         <p:spPr/>
         <p:txBody>
-          <a:bodyPr/>
+          <a:bodyPr>
+            <a:normAutofit lnSpcReduction="10000"/>
+          </a:bodyPr>
           <a:lstStyle/>
           <a:p>
-            <a:r>
-              <a:rPr lang="en-US" dirty="0" err="1" smtClean="0"/>
-              <a:t>MLLib</a:t>
-            </a:r>
+            <a:pPr>
+              <a:spcBef>
+                <a:spcPts val="600"/>
+              </a:spcBef>
+            </a:pPr>
             <a:r>
               <a:rPr lang="en-US" dirty="0" smtClean="0"/>
-              <a:t> – small machine learning library</a:t>
+              <a:t>MLLib – small machine learning library</a:t>
             </a:r>
           </a:p>
           <a:p>
+            <a:pPr>
+              <a:spcBef>
+                <a:spcPts val="600"/>
+              </a:spcBef>
+            </a:pPr>
             <a:r>
               <a:rPr lang="en-US" dirty="0" smtClean="0"/>
               <a:t>Use cases:</a:t>
@@ -12909,6 +12917,12 @@
           </a:p>
           <a:p>
             <a:pPr marL="914400" lvl="1" indent="-457200">
+              <a:spcBef>
+                <a:spcPts val="0"/>
+              </a:spcBef>
+              <a:spcAft>
+                <a:spcPts val="600"/>
+              </a:spcAft>
               <a:buFont typeface="Arial" pitchFamily="34" charset="0"/>
               <a:buChar char="•"/>
             </a:pPr>
@@ -12936,6 +12950,12 @@
           </a:p>
           <a:p>
             <a:pPr marL="914400" lvl="1" indent="-457200">
+              <a:spcBef>
+                <a:spcPts val="0"/>
+              </a:spcBef>
+              <a:spcAft>
+                <a:spcPts val="600"/>
+              </a:spcAft>
               <a:buFont typeface="Arial" pitchFamily="34" charset="0"/>
               <a:buChar char="•"/>
             </a:pPr>
@@ -12963,22 +12983,121 @@
           </a:p>
           <a:p>
             <a:pPr marL="914400" lvl="1" indent="-457200">
+              <a:spcBef>
+                <a:spcPts val="0"/>
+              </a:spcBef>
+              <a:spcAft>
+                <a:spcPts val="600"/>
+              </a:spcAft>
               <a:buFont typeface="Arial" pitchFamily="34" charset="0"/>
               <a:buChar char="•"/>
             </a:pPr>
             <a:r>
               <a:rPr lang="en-US" dirty="0" smtClean="0"/>
-              <a:t>Classify Data </a:t>
-            </a:r>
-            <a:r>
-              <a:rPr lang="en-US" dirty="0"/>
-              <a:t>Set: </a:t>
+              <a:t>Train Bayes Net: </a:t>
+            </a:r>
+            <a:r>
+              <a:rPr lang="en-US" i="1" dirty="0" err="1" smtClean="0"/>
+              <a:t>BayesClassifier</a:t>
             </a:r>
             <a:r>
               <a:rPr lang="en-US" i="1" dirty="0" smtClean="0"/>
-              <a:t>Classifier::classify</a:t>
+              <a:t>::train</a:t>
+            </a:r>
+            <a:endParaRPr lang="en-US" dirty="0" smtClean="0"/>
+          </a:p>
+          <a:p>
+            <a:pPr>
+              <a:spcBef>
+                <a:spcPts val="600"/>
+              </a:spcBef>
+            </a:pPr>
+            <a:r>
+              <a:rPr lang="en-US" dirty="0" smtClean="0"/>
+              <a:t>Code </a:t>
+            </a:r>
+            <a:r>
+              <a:rPr lang="en-US" dirty="0" smtClean="0"/>
+              <a:t>changes:</a:t>
+            </a:r>
+          </a:p>
+          <a:p>
+            <a:pPr marL="914400" lvl="1" indent="-457200">
+              <a:spcBef>
+                <a:spcPts val="0"/>
+              </a:spcBef>
+              <a:spcAft>
+                <a:spcPts val="600"/>
+              </a:spcAft>
+              <a:buFont typeface="Arial" pitchFamily="34" charset="0"/>
+              <a:buChar char="•"/>
+            </a:pPr>
+            <a:r>
+              <a:rPr lang="en-US" i="1" dirty="0" err="1" smtClean="0"/>
+              <a:t>ARFFDataSetIO</a:t>
+            </a:r>
+            <a:r>
+              <a:rPr lang="en-US" i="1" dirty="0" smtClean="0"/>
+              <a:t>::_</a:t>
+            </a:r>
+            <a:r>
+              <a:rPr lang="en-US" i="1" dirty="0" err="1" smtClean="0"/>
+              <a:t>readDataPoint</a:t>
             </a:r>
             <a:endParaRPr lang="en-US" i="1" dirty="0"/>
+          </a:p>
+          <a:p>
+            <a:pPr marL="914400" lvl="1" indent="-457200">
+              <a:spcBef>
+                <a:spcPts val="0"/>
+              </a:spcBef>
+              <a:spcAft>
+                <a:spcPts val="600"/>
+              </a:spcAft>
+              <a:buFont typeface="Arial" pitchFamily="34" charset="0"/>
+              <a:buChar char="•"/>
+            </a:pPr>
+            <a:r>
+              <a:rPr lang="en-US" i="1" dirty="0" err="1" smtClean="0"/>
+              <a:t>DataPoint</a:t>
+            </a:r>
+            <a:r>
+              <a:rPr lang="en-US" i="1" dirty="0" smtClean="0"/>
+              <a:t>::</a:t>
+            </a:r>
+            <a:r>
+              <a:rPr lang="en-US" i="1" dirty="0" err="1" smtClean="0"/>
+              <a:t>getEnumValue</a:t>
+            </a:r>
+            <a:endParaRPr lang="en-US" i="1" dirty="0"/>
+          </a:p>
+          <a:p>
+            <a:pPr marL="914400" lvl="1" indent="-457200">
+              <a:spcBef>
+                <a:spcPts val="0"/>
+              </a:spcBef>
+              <a:spcAft>
+                <a:spcPts val="600"/>
+              </a:spcAft>
+              <a:buFont typeface="Arial" pitchFamily="34" charset="0"/>
+              <a:buChar char="•"/>
+            </a:pPr>
+            <a:r>
+              <a:rPr lang="en-US" i="1" dirty="0" err="1"/>
+              <a:t>DataPoint</a:t>
+            </a:r>
+            <a:r>
+              <a:rPr lang="en-US" i="1" dirty="0" smtClean="0"/>
+              <a:t>::</a:t>
+            </a:r>
+            <a:r>
+              <a:rPr lang="en-US" i="1" dirty="0" err="1" smtClean="0"/>
+              <a:t>setEnumValue</a:t>
+            </a:r>
+            <a:endParaRPr lang="en-US" dirty="0" smtClean="0"/>
+          </a:p>
+          <a:p>
+            <a:endParaRPr lang="en-US" dirty="0" smtClean="0"/>
           </a:p>
         </p:txBody>
       </p:sp>
@@ -13044,7 +13163,7 @@
       </p:sp>
       <p:pic>
         <p:nvPicPr>
-          <p:cNvPr id="2050" name="Picture 2"/>
+          <p:cNvPr id="1026" name="Picture 2"/>
           <p:cNvPicPr>
             <a:picLocks noChangeAspect="1" noChangeArrowheads="1"/>
           </p:cNvPicPr>
@@ -13065,8 +13184,8 @@
         </p:blipFill>
         <p:spPr bwMode="auto">
           <a:xfrm>
-            <a:off x="1219200" y="1417638"/>
-            <a:ext cx="6797909" cy="4953000"/>
+            <a:off x="504825" y="1524000"/>
+            <a:ext cx="8143875" cy="4876800"/>
           </a:xfrm>
           <a:prstGeom prst="rect">
             <a:avLst/>
@@ -13114,54 +13233,8 @@
         </p:nvSpPr>
         <p:spPr>
           <a:xfrm>
-            <a:off x="1219200" y="1417638"/>
-            <a:ext cx="2133600" cy="4953000"/>
-          </a:xfrm>
-          <a:prstGeom prst="rect">
-            <a:avLst/>
-          </a:prstGeom>
-          <a:solidFill>
-            <a:srgbClr val="000000">
-              <a:alpha val="25098"/>
-            </a:srgbClr>
-          </a:solidFill>
-          <a:ln>
-            <a:noFill/>
-          </a:ln>
-        </p:spPr>
-        <p:style>
-          <a:lnRef idx="1">
-            <a:schemeClr val="accent1"/>
-          </a:lnRef>
-          <a:fillRef idx="3">
-            <a:schemeClr val="accent1"/>
-          </a:fillRef>
-          <a:effectRef idx="2">
-            <a:schemeClr val="accent1"/>
-          </a:effectRef>
-          <a:fontRef idx="minor">
-            <a:schemeClr val="lt1"/>
-          </a:fontRef>
-        </p:style>
-        <p:txBody>
-          <a:bodyPr rtlCol="0" anchor="ctr"/>
-          <a:lstStyle/>
-          <a:p>
-            <a:pPr algn="ctr"/>
-            <a:endParaRPr lang="en-US"/>
-          </a:p>
-        </p:txBody>
-      </p:sp>
-      <p:sp>
-        <p:nvSpPr>
-          <p:cNvPr id="6" name="Rectangle 5"/>
-          <p:cNvSpPr/>
-          <p:nvPr/>
-        </p:nvSpPr>
-        <p:spPr>
-          <a:xfrm>
-            <a:off x="5943600" y="1417638"/>
-            <a:ext cx="2073509" cy="4953000"/>
+            <a:off x="504824" y="1524000"/>
+            <a:ext cx="3990975" cy="4876800"/>
           </a:xfrm>
           <a:prstGeom prst="rect">
             <a:avLst/>
@@ -13258,25 +13331,496 @@
           </a:p>
         </p:txBody>
       </p:sp>
-      <p:sp>
-        <p:nvSpPr>
-          <p:cNvPr id="3" name="Content Placeholder 2"/>
-          <p:cNvSpPr>
-            <a:spLocks noGrp="1"/>
-          </p:cNvSpPr>
+      <p:graphicFrame>
+        <p:nvGraphicFramePr>
+          <p:cNvPr id="5" name="Table 4"/>
+          <p:cNvGraphicFramePr>
+            <a:graphicFrameLocks noGrp="1"/>
+          </p:cNvGraphicFramePr>
           <p:nvPr>
-            <p:ph idx="1"/>
+            <p:extLst>
+              <p:ext uri="{D42A27DB-BD31-4B8C-83A1-F6EECF244321}">
+                <p14:modId xmlns:p14="http://schemas.microsoft.com/office/powerpoint/2010/main" val="549086655"/>
+              </p:ext>
+            </p:extLst>
           </p:nvPr>
-        </p:nvSpPr>
-        <p:spPr/>
-        <p:txBody>
-          <a:bodyPr/>
-          <a:lstStyle/>
-          <a:p>
-            <a:endParaRPr lang="en-US"/>
-          </a:p>
-        </p:txBody>
-      </p:sp>
+        </p:nvGraphicFramePr>
+        <p:xfrm>
+          <a:off x="1028700" y="1676400"/>
+          <a:ext cx="7239000" cy="2900680"/>
+        </p:xfrm>
+        <a:graphic>
+          <a:graphicData uri="http://schemas.openxmlformats.org/drawingml/2006/table">
+            <a:tbl>
+              <a:tblPr firstRow="1" bandRow="1">
+                <a:effectLst>
+                  <a:outerShdw blurRad="50800" dist="38100" dir="2700000" algn="tl" rotWithShape="0">
+                    <a:prstClr val="black">
+                      <a:alpha val="40000"/>
+                    </a:prstClr>
+                  </a:outerShdw>
+                </a:effectLst>
+                <a:tableStyleId>{D7AC3CCA-C797-4891-BE02-D94E43425B78}</a:tableStyleId>
+              </a:tblPr>
+              <a:tblGrid>
+                <a:gridCol w="1927860"/>
+                <a:gridCol w="5311140"/>
+              </a:tblGrid>
+              <a:tr h="431800">
+                <a:tc>
+                  <a:txBody>
+                    <a:bodyPr/>
+                    <a:lstStyle/>
+                    <a:p>
+                      <a:r>
+                        <a:rPr lang="en-US" b="0" dirty="0" smtClean="0">
+                          <a:latin typeface="小塚ゴシック Pro M" pitchFamily="34" charset="-128"/>
+                          <a:ea typeface="小塚ゴシック Pro M" pitchFamily="34" charset="-128"/>
+                        </a:rPr>
+                        <a:t>Use</a:t>
+                      </a:r>
+                      <a:r>
+                        <a:rPr lang="en-US" b="0" baseline="0" dirty="0" smtClean="0">
+                          <a:latin typeface="小塚ゴシック Pro M" pitchFamily="34" charset="-128"/>
+                          <a:ea typeface="小塚ゴシック Pro M" pitchFamily="34" charset="-128"/>
+                        </a:rPr>
+                        <a:t> Case</a:t>
+                      </a:r>
+                      <a:endParaRPr lang="en-US" b="0" dirty="0">
+                        <a:latin typeface="小塚ゴシック Pro M" pitchFamily="34" charset="-128"/>
+                        <a:ea typeface="小塚ゴシック Pro M" pitchFamily="34" charset="-128"/>
+                      </a:endParaRPr>
+                    </a:p>
+                  </a:txBody>
+                  <a:tcPr anchor="b"/>
+                </a:tc>
+                <a:tc>
+                  <a:txBody>
+                    <a:bodyPr/>
+                    <a:lstStyle/>
+                    <a:p>
+                      <a:r>
+                        <a:rPr lang="en-US" b="0" dirty="0" smtClean="0">
+                          <a:latin typeface="小塚ゴシック Pro M" pitchFamily="34" charset="-128"/>
+                          <a:ea typeface="小塚ゴシック Pro M" pitchFamily="34" charset="-128"/>
+                        </a:rPr>
+                        <a:t>Call</a:t>
+                      </a:r>
+                      <a:r>
+                        <a:rPr lang="en-US" b="0" baseline="0" dirty="0" smtClean="0">
+                          <a:latin typeface="小塚ゴシック Pro M" pitchFamily="34" charset="-128"/>
+                          <a:ea typeface="小塚ゴシック Pro M" pitchFamily="34" charset="-128"/>
+                        </a:rPr>
+                        <a:t> Graph Path</a:t>
+                      </a:r>
+                      <a:endParaRPr lang="en-US" b="0" dirty="0">
+                        <a:latin typeface="小塚ゴシック Pro M" pitchFamily="34" charset="-128"/>
+                        <a:ea typeface="小塚ゴシック Pro M" pitchFamily="34" charset="-128"/>
+                      </a:endParaRPr>
+                    </a:p>
+                  </a:txBody>
+                  <a:tcPr anchor="b"/>
+                </a:tc>
+              </a:tr>
+              <a:tr h="370840">
+                <a:tc>
+                  <a:txBody>
+                    <a:bodyPr/>
+                    <a:lstStyle/>
+                    <a:p>
+                      <a:r>
+                        <a:rPr lang="en-US" b="0" i="0" dirty="0" smtClean="0">
+                          <a:latin typeface="小塚ゴシック Pro L" pitchFamily="34" charset="-128"/>
+                          <a:ea typeface="小塚ゴシック Pro L" pitchFamily="34" charset="-128"/>
+                        </a:rPr>
+                        <a:t>Load Data Set</a:t>
+                      </a:r>
+                      <a:endParaRPr lang="en-US" b="0" i="0" dirty="0">
+                        <a:latin typeface="小塚ゴシック Pro L" pitchFamily="34" charset="-128"/>
+                        <a:ea typeface="小塚ゴシック Pro L" pitchFamily="34" charset="-128"/>
+                      </a:endParaRPr>
+                    </a:p>
+                  </a:txBody>
+                  <a:tcPr anchor="ctr">
+                    <a:solidFill>
+                      <a:schemeClr val="bg1"/>
+                    </a:solidFill>
+                  </a:tcPr>
+                </a:tc>
+                <a:tc>
+                  <a:txBody>
+                    <a:bodyPr/>
+                    <a:lstStyle/>
+                    <a:p>
+                      <a:r>
+                        <a:rPr lang="en-US" i="0" dirty="0" err="1" smtClean="0">
+                          <a:latin typeface="小塚ゴシック Pro L" pitchFamily="34" charset="-128"/>
+                          <a:ea typeface="小塚ゴシック Pro L" pitchFamily="34" charset="-128"/>
+                        </a:rPr>
+                        <a:t>MLLibCore</a:t>
+                      </a:r>
+                      <a:r>
+                        <a:rPr lang="en-US" i="0" dirty="0" smtClean="0">
+                          <a:latin typeface="小塚ゴシック Pro L" pitchFamily="34" charset="-128"/>
+                          <a:ea typeface="小塚ゴシック Pro L" pitchFamily="34" charset="-128"/>
+                        </a:rPr>
+                        <a:t>::</a:t>
+                      </a:r>
+                      <a:r>
+                        <a:rPr lang="en-US" i="0" dirty="0" err="1" smtClean="0">
+                          <a:latin typeface="小塚ゴシック Pro L" pitchFamily="34" charset="-128"/>
+                          <a:ea typeface="小塚ゴシック Pro L" pitchFamily="34" charset="-128"/>
+                        </a:rPr>
+                        <a:t>loadDataSet</a:t>
+                      </a:r>
+                      <a:r>
+                        <a:rPr lang="en-US" i="0" dirty="0" smtClean="0">
+                          <a:latin typeface="小塚ゴシック Pro L" pitchFamily="34" charset="-128"/>
+                          <a:ea typeface="小塚ゴシック Pro L" pitchFamily="34" charset="-128"/>
+                        </a:rPr>
+                        <a:t> → </a:t>
+                      </a:r>
+                      <a:r>
+                        <a:rPr lang="en-US" i="0" dirty="0" err="1" smtClean="0">
+                          <a:latin typeface="小塚ゴシック Pro L" pitchFamily="34" charset="-128"/>
+                          <a:ea typeface="小塚ゴシック Pro L" pitchFamily="34" charset="-128"/>
+                        </a:rPr>
+                        <a:t>ARFFDataSetIO</a:t>
+                      </a:r>
+                      <a:r>
+                        <a:rPr lang="en-US" i="0" dirty="0" smtClean="0">
+                          <a:latin typeface="小塚ゴシック Pro L" pitchFamily="34" charset="-128"/>
+                          <a:ea typeface="小塚ゴシック Pro L" pitchFamily="34" charset="-128"/>
+                        </a:rPr>
+                        <a:t>::read</a:t>
+                      </a:r>
+                      <a:r>
+                        <a:rPr lang="en-US" i="0" dirty="0" smtClean="0">
+                          <a:latin typeface="小塚ゴシック Pro L" pitchFamily="34" charset="-128"/>
+                          <a:ea typeface="小塚ゴシック Pro L" pitchFamily="34" charset="-128"/>
+                        </a:rPr>
+                        <a:t> → </a:t>
+                      </a:r>
+                      <a:r>
+                        <a:rPr lang="en-US" i="0" dirty="0" err="1" smtClean="0">
+                          <a:latin typeface="小塚ゴシック Pro L" pitchFamily="34" charset="-128"/>
+                          <a:ea typeface="小塚ゴシック Pro L" pitchFamily="34" charset="-128"/>
+                        </a:rPr>
+                        <a:t>ARFFDataSetIO</a:t>
+                      </a:r>
+                      <a:r>
+                        <a:rPr lang="en-US" i="0" dirty="0" smtClean="0">
+                          <a:latin typeface="小塚ゴシック Pro L" pitchFamily="34" charset="-128"/>
+                          <a:ea typeface="小塚ゴシック Pro L" pitchFamily="34" charset="-128"/>
+                        </a:rPr>
+                        <a:t>::_</a:t>
+                      </a:r>
+                      <a:r>
+                        <a:rPr lang="en-US" i="0" dirty="0" err="1" smtClean="0">
+                          <a:latin typeface="小塚ゴシック Pro L" pitchFamily="34" charset="-128"/>
+                          <a:ea typeface="小塚ゴシック Pro L" pitchFamily="34" charset="-128"/>
+                        </a:rPr>
+                        <a:t>readData</a:t>
+                      </a:r>
+                      <a:r>
+                        <a:rPr lang="en-US" i="0" dirty="0" smtClean="0">
+                          <a:latin typeface="小塚ゴシック Pro L" pitchFamily="34" charset="-128"/>
+                          <a:ea typeface="小塚ゴシック Pro L" pitchFamily="34" charset="-128"/>
+                        </a:rPr>
+                        <a:t> → </a:t>
+                      </a:r>
+                      <a:r>
+                        <a:rPr lang="en-US" i="0" dirty="0" err="1" smtClean="0">
+                          <a:latin typeface="小塚ゴシック Pro L" pitchFamily="34" charset="-128"/>
+                          <a:ea typeface="小塚ゴシック Pro L" pitchFamily="34" charset="-128"/>
+                        </a:rPr>
+                        <a:t>ARFFDataSetIO</a:t>
+                      </a:r>
+                      <a:r>
+                        <a:rPr lang="en-US" i="0" dirty="0" smtClean="0">
+                          <a:latin typeface="小塚ゴシック Pro L" pitchFamily="34" charset="-128"/>
+                          <a:ea typeface="小塚ゴシック Pro L" pitchFamily="34" charset="-128"/>
+                        </a:rPr>
+                        <a:t>::_</a:t>
+                      </a:r>
+                      <a:r>
+                        <a:rPr lang="en-US" i="0" dirty="0" err="1" smtClean="0">
+                          <a:latin typeface="小塚ゴシック Pro L" pitchFamily="34" charset="-128"/>
+                          <a:ea typeface="小塚ゴシック Pro L" pitchFamily="34" charset="-128"/>
+                        </a:rPr>
+                        <a:t>readDataPoint</a:t>
+                      </a:r>
+                      <a:endParaRPr lang="en-US" b="0" i="0" dirty="0">
+                        <a:latin typeface="小塚ゴシック Pro L" pitchFamily="34" charset="-128"/>
+                        <a:ea typeface="小塚ゴシック Pro L" pitchFamily="34" charset="-128"/>
+                      </a:endParaRPr>
+                    </a:p>
+                  </a:txBody>
+                  <a:tcPr anchor="b">
+                    <a:solidFill>
+                      <a:schemeClr val="bg1"/>
+                    </a:solidFill>
+                  </a:tcPr>
+                </a:tc>
+              </a:tr>
+              <a:tr h="370840">
+                <a:tc>
+                  <a:txBody>
+                    <a:bodyPr/>
+                    <a:lstStyle/>
+                    <a:p>
+                      <a:r>
+                        <a:rPr lang="en-US" b="0" i="0" dirty="0" smtClean="0">
+                          <a:latin typeface="小塚ゴシック Pro L" pitchFamily="34" charset="-128"/>
+                          <a:ea typeface="小塚ゴシック Pro L" pitchFamily="34" charset="-128"/>
+                        </a:rPr>
+                        <a:t>Save Data Set</a:t>
+                      </a:r>
+                      <a:endParaRPr lang="en-US" b="0" i="0" dirty="0">
+                        <a:latin typeface="小塚ゴシック Pro L" pitchFamily="34" charset="-128"/>
+                        <a:ea typeface="小塚ゴシック Pro L" pitchFamily="34" charset="-128"/>
+                      </a:endParaRPr>
+                    </a:p>
+                  </a:txBody>
+                  <a:tcPr anchor="ctr">
+                    <a:solidFill>
+                      <a:schemeClr val="bg1"/>
+                    </a:solidFill>
+                  </a:tcPr>
+                </a:tc>
+                <a:tc>
+                  <a:txBody>
+                    <a:bodyPr/>
+                    <a:lstStyle/>
+                    <a:p>
+                      <a:r>
+                        <a:rPr lang="en-US" i="0" dirty="0" err="1" smtClean="0">
+                          <a:latin typeface="小塚ゴシック Pro L" pitchFamily="34" charset="-128"/>
+                          <a:ea typeface="小塚ゴシック Pro L" pitchFamily="34" charset="-128"/>
+                        </a:rPr>
+                        <a:t>MLLibCore</a:t>
+                      </a:r>
+                      <a:r>
+                        <a:rPr lang="en-US" i="0" dirty="0" smtClean="0">
+                          <a:latin typeface="小塚ゴシック Pro L" pitchFamily="34" charset="-128"/>
+                          <a:ea typeface="小塚ゴシック Pro L" pitchFamily="34" charset="-128"/>
+                        </a:rPr>
+                        <a:t>::</a:t>
+                      </a:r>
+                      <a:r>
+                        <a:rPr lang="en-US" i="0" dirty="0" err="1" smtClean="0">
+                          <a:latin typeface="小塚ゴシック Pro L" pitchFamily="34" charset="-128"/>
+                          <a:ea typeface="小塚ゴシック Pro L" pitchFamily="34" charset="-128"/>
+                        </a:rPr>
+                        <a:t>saveDataSet</a:t>
+                      </a:r>
+                      <a:r>
+                        <a:rPr lang="en-US" i="0" dirty="0" smtClean="0">
+                          <a:latin typeface="小塚ゴシック Pro L" pitchFamily="34" charset="-128"/>
+                          <a:ea typeface="小塚ゴシック Pro L" pitchFamily="34" charset="-128"/>
+                        </a:rPr>
+                        <a:t> → </a:t>
+                      </a:r>
+                      <a:r>
+                        <a:rPr lang="en-US" i="0" dirty="0" err="1" smtClean="0">
+                          <a:latin typeface="小塚ゴシック Pro L" pitchFamily="34" charset="-128"/>
+                          <a:ea typeface="小塚ゴシック Pro L" pitchFamily="34" charset="-128"/>
+                        </a:rPr>
+                        <a:t>ARFFDataSetIO</a:t>
+                      </a:r>
+                      <a:r>
+                        <a:rPr lang="en-US" i="0" dirty="0" smtClean="0">
+                          <a:latin typeface="小塚ゴシック Pro L" pitchFamily="34" charset="-128"/>
+                          <a:ea typeface="小塚ゴシック Pro L" pitchFamily="34" charset="-128"/>
+                        </a:rPr>
+                        <a:t>::write</a:t>
+                      </a:r>
+                      <a:r>
+                        <a:rPr lang="en-US" i="0" dirty="0" smtClean="0">
+                          <a:latin typeface="小塚ゴシック Pro L" pitchFamily="34" charset="-128"/>
+                          <a:ea typeface="小塚ゴシック Pro L" pitchFamily="34" charset="-128"/>
+                        </a:rPr>
+                        <a:t> → </a:t>
+                      </a:r>
+                      <a:r>
+                        <a:rPr lang="en-US" i="0" dirty="0" err="1" smtClean="0">
+                          <a:latin typeface="小塚ゴシック Pro L" pitchFamily="34" charset="-128"/>
+                          <a:ea typeface="小塚ゴシック Pro L" pitchFamily="34" charset="-128"/>
+                        </a:rPr>
+                        <a:t>DataPoint</a:t>
+                      </a:r>
+                      <a:r>
+                        <a:rPr lang="en-US" i="0" dirty="0" smtClean="0">
+                          <a:latin typeface="小塚ゴシック Pro L" pitchFamily="34" charset="-128"/>
+                          <a:ea typeface="小塚ゴシック Pro L" pitchFamily="34" charset="-128"/>
+                        </a:rPr>
+                        <a:t>::</a:t>
+                      </a:r>
+                      <a:r>
+                        <a:rPr lang="en-US" i="0" dirty="0" err="1" smtClean="0">
+                          <a:latin typeface="小塚ゴシック Pro L" pitchFamily="34" charset="-128"/>
+                          <a:ea typeface="小塚ゴシック Pro L" pitchFamily="34" charset="-128"/>
+                        </a:rPr>
+                        <a:t>getEnumValue</a:t>
+                      </a:r>
+                      <a:endParaRPr lang="en-US" b="0" i="0" dirty="0">
+                        <a:latin typeface="小塚ゴシック Pro L" pitchFamily="34" charset="-128"/>
+                        <a:ea typeface="小塚ゴシック Pro L" pitchFamily="34" charset="-128"/>
+                      </a:endParaRPr>
+                    </a:p>
+                  </a:txBody>
+                  <a:tcPr>
+                    <a:solidFill>
+                      <a:schemeClr val="bg1"/>
+                    </a:solidFill>
+                  </a:tcPr>
+                </a:tc>
+              </a:tr>
+              <a:tr h="370840">
+                <a:tc>
+                  <a:txBody>
+                    <a:bodyPr/>
+                    <a:lstStyle/>
+                    <a:p>
+                      <a:r>
+                        <a:rPr lang="en-US" b="0" i="0" dirty="0" smtClean="0">
+                          <a:latin typeface="小塚ゴシック Pro L" pitchFamily="34" charset="-128"/>
+                          <a:ea typeface="小塚ゴシック Pro L" pitchFamily="34" charset="-128"/>
+                        </a:rPr>
+                        <a:t>Train Bayes Net</a:t>
+                      </a:r>
+                      <a:endParaRPr lang="en-US" b="0" i="0" dirty="0">
+                        <a:latin typeface="小塚ゴシック Pro L" pitchFamily="34" charset="-128"/>
+                        <a:ea typeface="小塚ゴシック Pro L" pitchFamily="34" charset="-128"/>
+                      </a:endParaRPr>
+                    </a:p>
+                  </a:txBody>
+                  <a:tcPr anchor="ctr">
+                    <a:solidFill>
+                      <a:schemeClr val="bg1"/>
+                    </a:solidFill>
+                  </a:tcPr>
+                </a:tc>
+                <a:tc>
+                  <a:txBody>
+                    <a:bodyPr/>
+                    <a:lstStyle/>
+                    <a:p>
+                      <a:r>
+                        <a:rPr lang="en-US" i="0" dirty="0" err="1" smtClean="0">
+                          <a:latin typeface="小塚ゴシック Pro L" pitchFamily="34" charset="-128"/>
+                          <a:ea typeface="小塚ゴシック Pro L" pitchFamily="34" charset="-128"/>
+                        </a:rPr>
+                        <a:t>BayesClassifier</a:t>
+                      </a:r>
+                      <a:r>
+                        <a:rPr lang="en-US" i="0" dirty="0" smtClean="0">
+                          <a:latin typeface="小塚ゴシック Pro L" pitchFamily="34" charset="-128"/>
+                          <a:ea typeface="小塚ゴシック Pro L" pitchFamily="34" charset="-128"/>
+                        </a:rPr>
+                        <a:t>::train</a:t>
+                      </a:r>
+                      <a:r>
+                        <a:rPr lang="en-US" i="0" dirty="0" smtClean="0">
+                          <a:latin typeface="小塚ゴシック Pro L" pitchFamily="34" charset="-128"/>
+                          <a:ea typeface="小塚ゴシック Pro L" pitchFamily="34" charset="-128"/>
+                        </a:rPr>
+                        <a:t> → </a:t>
+                      </a:r>
+                      <a:r>
+                        <a:rPr lang="en-US" i="0" dirty="0" err="1" smtClean="0">
+                          <a:latin typeface="小塚ゴシック Pro L" pitchFamily="34" charset="-128"/>
+                          <a:ea typeface="小塚ゴシック Pro L" pitchFamily="34" charset="-128"/>
+                        </a:rPr>
+                        <a:t>BayesClassifier</a:t>
+                      </a:r>
+                      <a:r>
+                        <a:rPr lang="en-US" i="0" dirty="0" smtClean="0">
+                          <a:latin typeface="小塚ゴシック Pro L" pitchFamily="34" charset="-128"/>
+                          <a:ea typeface="小塚ゴシック Pro L" pitchFamily="34" charset="-128"/>
+                        </a:rPr>
+                        <a:t>::_</a:t>
+                      </a:r>
+                      <a:r>
+                        <a:rPr lang="en-US" i="0" dirty="0" err="1" smtClean="0">
+                          <a:latin typeface="小塚ゴシック Pro L" pitchFamily="34" charset="-128"/>
+                          <a:ea typeface="小塚ゴシック Pro L" pitchFamily="34" charset="-128"/>
+                        </a:rPr>
+                        <a:t>trainTAN</a:t>
+                      </a:r>
+                      <a:r>
+                        <a:rPr lang="en-US" i="0" dirty="0" smtClean="0">
+                          <a:latin typeface="小塚ゴシック Pro L" pitchFamily="34" charset="-128"/>
+                          <a:ea typeface="小塚ゴシック Pro L" pitchFamily="34" charset="-128"/>
+                        </a:rPr>
+                        <a:t> → </a:t>
+                      </a:r>
+                      <a:r>
+                        <a:rPr lang="en-US" i="0" dirty="0" err="1" smtClean="0">
+                          <a:latin typeface="小塚ゴシック Pro L" pitchFamily="34" charset="-128"/>
+                          <a:ea typeface="小塚ゴシック Pro L" pitchFamily="34" charset="-128"/>
+                        </a:rPr>
+                        <a:t>BayesClassifier</a:t>
+                      </a:r>
+                      <a:r>
+                        <a:rPr lang="en-US" i="0" dirty="0" smtClean="0">
+                          <a:latin typeface="小塚ゴシック Pro L" pitchFamily="34" charset="-128"/>
+                          <a:ea typeface="小塚ゴシック Pro L" pitchFamily="34" charset="-128"/>
+                        </a:rPr>
+                        <a:t>::_</a:t>
+                      </a:r>
+                      <a:r>
+                        <a:rPr lang="en-US" i="0" dirty="0" err="1" smtClean="0">
+                          <a:latin typeface="小塚ゴシック Pro L" pitchFamily="34" charset="-128"/>
+                          <a:ea typeface="小塚ゴシック Pro L" pitchFamily="34" charset="-128"/>
+                        </a:rPr>
+                        <a:t>computeMutualInf</a:t>
+                      </a:r>
+                      <a:r>
+                        <a:rPr lang="en-US" i="0" dirty="0" smtClean="0">
+                          <a:latin typeface="小塚ゴシック Pro L" pitchFamily="34" charset="-128"/>
+                          <a:ea typeface="小塚ゴシック Pro L" pitchFamily="34" charset="-128"/>
+                        </a:rPr>
+                        <a:t> → </a:t>
+                      </a:r>
+                      <a:r>
+                        <a:rPr lang="en-US" i="0" dirty="0" err="1" smtClean="0">
+                          <a:latin typeface="小塚ゴシック Pro L" pitchFamily="34" charset="-128"/>
+                          <a:ea typeface="小塚ゴシック Pro L" pitchFamily="34" charset="-128"/>
+                        </a:rPr>
+                        <a:t>DataPoint</a:t>
+                      </a:r>
+                      <a:r>
+                        <a:rPr lang="en-US" i="0" dirty="0" smtClean="0">
+                          <a:latin typeface="小塚ゴシック Pro L" pitchFamily="34" charset="-128"/>
+                          <a:ea typeface="小塚ゴシック Pro L" pitchFamily="34" charset="-128"/>
+                        </a:rPr>
+                        <a:t>::</a:t>
+                      </a:r>
+                      <a:r>
+                        <a:rPr lang="en-US" i="0" dirty="0" err="1" smtClean="0">
+                          <a:latin typeface="小塚ゴシック Pro L" pitchFamily="34" charset="-128"/>
+                          <a:ea typeface="小塚ゴシック Pro L" pitchFamily="34" charset="-128"/>
+                        </a:rPr>
+                        <a:t>getEnumValue</a:t>
+                      </a:r>
+                      <a:endParaRPr lang="en-US" b="0" i="0" dirty="0">
+                        <a:latin typeface="小塚ゴシック Pro L" pitchFamily="34" charset="-128"/>
+                        <a:ea typeface="小塚ゴシック Pro L" pitchFamily="34" charset="-128"/>
+                      </a:endParaRPr>
+                    </a:p>
+                  </a:txBody>
+                  <a:tcPr>
+                    <a:solidFill>
+                      <a:schemeClr val="bg1"/>
+                    </a:solidFill>
+                  </a:tcPr>
+                </a:tc>
+              </a:tr>
+            </a:tbl>
+          </a:graphicData>
+        </a:graphic>
+      </p:graphicFrame>
     </p:spTree>
     <p:extLst>
       <p:ext uri="{BB962C8B-B14F-4D97-AF65-F5344CB8AC3E}">
@@ -13337,21 +13881,112 @@
           </a:p>
         </p:txBody>
       </p:sp>
+      <p:pic>
+        <p:nvPicPr>
+          <p:cNvPr id="2050" name="Picture 2"/>
+          <p:cNvPicPr>
+            <a:picLocks noChangeAspect="1" noChangeArrowheads="1"/>
+          </p:cNvPicPr>
+          <p:nvPr/>
+        </p:nvPicPr>
+        <p:blipFill>
+          <a:blip r:embed="rId2">
+            <a:extLst>
+              <a:ext uri="{28A0092B-C50C-407E-A947-70E740481C1C}">
+                <a14:useLocalDpi xmlns:a14="http://schemas.microsoft.com/office/drawing/2010/main" val="0"/>
+              </a:ext>
+            </a:extLst>
+          </a:blip>
+          <a:srcRect/>
+          <a:stretch>
+            <a:fillRect/>
+          </a:stretch>
+        </p:blipFill>
+        <p:spPr bwMode="auto">
+          <a:xfrm>
+            <a:off x="500063" y="1543050"/>
+            <a:ext cx="8143875" cy="4857750"/>
+          </a:xfrm>
+          <a:prstGeom prst="rect">
+            <a:avLst/>
+          </a:prstGeom>
+          <a:noFill/>
+          <a:ln>
+            <a:noFill/>
+          </a:ln>
+          <a:effectLst/>
+          <a:extLst>
+            <a:ext uri="{909E8E84-426E-40DD-AFC4-6F175D3DCCD1}">
+              <a14:hiddenFill xmlns:a14="http://schemas.microsoft.com/office/drawing/2010/main">
+                <a:solidFill>
+                  <a:schemeClr val="accent1"/>
+                </a:solidFill>
+              </a14:hiddenFill>
+            </a:ext>
+            <a:ext uri="{91240B29-F687-4F45-9708-019B960494DF}">
+              <a14:hiddenLine xmlns:a14="http://schemas.microsoft.com/office/drawing/2010/main" w="9525">
+                <a:solidFill>
+                  <a:schemeClr val="tx1"/>
+                </a:solidFill>
+                <a:miter lim="800000"/>
+                <a:headEnd/>
+                <a:tailEnd/>
+              </a14:hiddenLine>
+            </a:ext>
+            <a:ext uri="{AF507438-7753-43E0-B8FC-AC1667EBCBE1}">
+              <a14:hiddenEffects xmlns:a14="http://schemas.microsoft.com/office/drawing/2010/main">
+                <a:effectLst>
+                  <a:outerShdw dist="35921" dir="2700000" algn="ctr" rotWithShape="0">
+                    <a:schemeClr val="bg2"/>
+                  </a:outerShdw>
+                </a:effectLst>
+              </a14:hiddenEffects>
+            </a:ext>
+          </a:extLst>
+        </p:spPr>
+      </p:pic>
       <p:sp>
         <p:nvSpPr>
-          <p:cNvPr id="3" name="Content Placeholder 2"/>
-          <p:cNvSpPr>
-            <a:spLocks noGrp="1"/>
-          </p:cNvSpPr>
-          <p:nvPr>
-            <p:ph idx="1"/>
-          </p:nvPr>
+          <p:cNvPr id="5" name="Rectangle 4"/>
+          <p:cNvSpPr/>
+          <p:nvPr/>
         </p:nvSpPr>
-        <p:spPr/>
+        <p:spPr>
+          <a:xfrm>
+            <a:off x="504824" y="1543050"/>
+            <a:ext cx="3990975" cy="4857750"/>
+          </a:xfrm>
+          <a:prstGeom prst="rect">
+            <a:avLst/>
+          </a:prstGeom>
+          <a:solidFill>
+            <a:srgbClr val="000000">
+              <a:alpha val="25098"/>
+            </a:srgbClr>
+          </a:solidFill>
+          <a:ln>
+            <a:noFill/>
+          </a:ln>
+        </p:spPr>
+        <p:style>
+          <a:lnRef idx="1">
+            <a:schemeClr val="accent1"/>
+          </a:lnRef>
+          <a:fillRef idx="3">
+            <a:schemeClr val="accent1"/>
+          </a:fillRef>
+          <a:effectRef idx="2">
+            <a:schemeClr val="accent1"/>
+          </a:effectRef>
+          <a:fontRef idx="minor">
+            <a:schemeClr val="lt1"/>
+          </a:fontRef>
+        </p:style>
         <p:txBody>
-          <a:bodyPr/>
+          <a:bodyPr rtlCol="0" anchor="ctr"/>
           <a:lstStyle/>
           <a:p>
+            <a:pPr algn="ctr"/>
             <a:endParaRPr lang="en-US"/>
           </a:p>
         </p:txBody>

</xml_diff>